<commit_message>
Updated exam and slides pptx
</commit_message>
<xml_diff>
--- a/assets/pptx/First-steps-with-R_day2_afternoon.pptx
+++ b/assets/pptx/First-steps-with-R_day2_afternoon.pptx
@@ -175,15 +175,6 @@
 </p:presentation>
 </file>
 
-<file path=ppt/revisionInfo.xml><?xml version="1.0" encoding="utf-8"?>
-<p1510:revInfo xmlns:a="http://schemas.openxmlformats.org/drawingml/2006/main" xmlns:r="http://schemas.openxmlformats.org/officeDocument/2006/relationships" xmlns:p1510="http://schemas.microsoft.com/office/powerpoint/2015/10/main">
-  <p1510:revLst>
-    <p1510:client id="{5ADE3042-1A5C-0BE8-EF19-704EDB3A521E}" v="8" dt="2022-10-05T13:16:02.395"/>
-    <p1510:client id="{AE90AF2D-C0CC-A921-5169-B612B9A11BBB}" v="56" dt="2022-10-06T08:39:35.290"/>
-  </p1510:revLst>
-</p1510:revInfo>
-</file>
-
 <file path=ppt/notesMasters/notesMaster1.xml><?xml version="1.0" encoding="utf-8"?>
 <p:notesMaster xmlns:a="http://schemas.openxmlformats.org/drawingml/2006/main" xmlns:r="http://schemas.openxmlformats.org/officeDocument/2006/relationships" xmlns:p="http://schemas.openxmlformats.org/presentationml/2006/main">
   <p:cSld>
@@ -396,7 +387,7 @@
               <a:rPr lang="en-US" sz="1400" b="0" strike="noStrike" spc="-1">
                 <a:latin typeface="Times New Roman"/>
               </a:rPr>
-              <a:t>‹#›</a:t>
+              <a:t>‹N°›</a:t>
             </a:fld>
             <a:endParaRPr lang="en-US" sz="1400" b="0" strike="noStrike" spc="-1">
               <a:latin typeface="Times New Roman"/>
@@ -23822,343 +23813,6 @@
       </p:grpSpPr>
       <p:sp>
         <p:nvSpPr>
-          <p:cNvPr id="8" name="Sous-titre 4"/>
-          <p:cNvSpPr txBox="1">
-            <a:spLocks/>
-          </p:cNvSpPr>
-          <p:nvPr/>
-        </p:nvSpPr>
-        <p:spPr>
-          <a:xfrm>
-            <a:off x="522000" y="5217516"/>
-            <a:ext cx="8100000" cy="866130"/>
-          </a:xfrm>
-          <a:prstGeom prst="rect">
-            <a:avLst/>
-          </a:prstGeom>
-        </p:spPr>
-        <p:txBody>
-          <a:bodyPr vert="horz" lIns="0" tIns="0" rIns="0" bIns="0" rtlCol="0" anchor="t">
-            <a:normAutofit fontScale="70000" lnSpcReduction="20000"/>
-          </a:bodyPr>
-          <a:lstStyle>
-            <a:lvl1pPr marL="0" indent="0" algn="l" defTabSz="914400" rtl="0" eaLnBrk="1" latinLnBrk="0" hangingPunct="1">
-              <a:spcBef>
-                <a:spcPts val="1200"/>
-              </a:spcBef>
-              <a:buFont typeface="Arial" pitchFamily="34" charset="0"/>
-              <a:buNone/>
-              <a:defRPr sz="2800" kern="1200">
-                <a:solidFill>
-                  <a:schemeClr val="accent1"/>
-                </a:solidFill>
-                <a:effectLst>
-                  <a:outerShdw blurRad="38100" dist="12700" dir="2700000" algn="ctr" rotWithShape="0">
-                    <a:srgbClr val="000000">
-                      <a:alpha val="43137"/>
-                    </a:srgbClr>
-                  </a:outerShdw>
-                </a:effectLst>
-                <a:latin typeface="Arial" pitchFamily="34" charset="0"/>
-                <a:ea typeface="+mn-ea"/>
-                <a:cs typeface="Arial" pitchFamily="34" charset="0"/>
-              </a:defRPr>
-            </a:lvl1pPr>
-            <a:lvl2pPr marL="457200" indent="0" algn="ctr" defTabSz="914400" rtl="0" eaLnBrk="1" latinLnBrk="0" hangingPunct="1">
-              <a:spcBef>
-                <a:spcPts val="2400"/>
-              </a:spcBef>
-              <a:buSzPct val="110000"/>
-              <a:buFontTx/>
-              <a:buNone/>
-              <a:defRPr sz="2400" b="1" kern="1200">
-                <a:solidFill>
-                  <a:schemeClr val="tx1">
-                    <a:tint val="75000"/>
-                  </a:schemeClr>
-                </a:solidFill>
-                <a:effectLst>
-                  <a:outerShdw blurRad="38100" dist="12700" dir="2700000" algn="ctr" rotWithShape="0">
-                    <a:srgbClr val="000000">
-                      <a:alpha val="43137"/>
-                    </a:srgbClr>
-                  </a:outerShdw>
-                </a:effectLst>
-                <a:latin typeface="Arial" pitchFamily="34" charset="0"/>
-                <a:ea typeface="+mn-ea"/>
-                <a:cs typeface="Arial" pitchFamily="34" charset="0"/>
-              </a:defRPr>
-            </a:lvl2pPr>
-            <a:lvl3pPr marL="914400" indent="0" algn="ctr" defTabSz="914400" rtl="0" eaLnBrk="1" latinLnBrk="0" hangingPunct="1">
-              <a:spcBef>
-                <a:spcPts val="0"/>
-              </a:spcBef>
-              <a:buFontTx/>
-              <a:buNone/>
-              <a:defRPr lang="fr-FR" sz="2400" kern="1200">
-                <a:solidFill>
-                  <a:schemeClr val="tx1">
-                    <a:tint val="75000"/>
-                  </a:schemeClr>
-                </a:solidFill>
-                <a:effectLst>
-                  <a:outerShdw blurRad="38100" dist="12700" dir="2700000" algn="ctr" rotWithShape="0">
-                    <a:srgbClr val="000000">
-                      <a:alpha val="43137"/>
-                    </a:srgbClr>
-                  </a:outerShdw>
-                </a:effectLst>
-                <a:latin typeface="Arial" pitchFamily="34" charset="0"/>
-                <a:ea typeface="+mn-ea"/>
-                <a:cs typeface="Arial" pitchFamily="34" charset="0"/>
-              </a:defRPr>
-            </a:lvl3pPr>
-            <a:lvl4pPr marL="1371600" indent="0" algn="ctr" defTabSz="914400" rtl="0" eaLnBrk="1" latinLnBrk="0" hangingPunct="1">
-              <a:spcBef>
-                <a:spcPts val="0"/>
-              </a:spcBef>
-              <a:buFontTx/>
-              <a:buNone/>
-              <a:defRPr sz="2400" b="0" kern="1200">
-                <a:solidFill>
-                  <a:schemeClr val="tx1">
-                    <a:tint val="75000"/>
-                  </a:schemeClr>
-                </a:solidFill>
-                <a:latin typeface="Arial" pitchFamily="34" charset="0"/>
-                <a:ea typeface="+mn-ea"/>
-                <a:cs typeface="Arial" pitchFamily="34" charset="0"/>
-              </a:defRPr>
-            </a:lvl4pPr>
-            <a:lvl5pPr marL="1828800" indent="0" algn="ctr" defTabSz="914400" rtl="0" eaLnBrk="1" latinLnBrk="0" hangingPunct="1">
-              <a:spcBef>
-                <a:spcPts val="0"/>
-              </a:spcBef>
-              <a:buFont typeface="Arial" pitchFamily="34" charset="0"/>
-              <a:buNone/>
-              <a:defRPr sz="2400" kern="1200">
-                <a:solidFill>
-                  <a:schemeClr val="tx1">
-                    <a:tint val="75000"/>
-                  </a:schemeClr>
-                </a:solidFill>
-                <a:latin typeface="Arial" pitchFamily="34" charset="0"/>
-                <a:ea typeface="+mn-ea"/>
-                <a:cs typeface="Arial" pitchFamily="34" charset="0"/>
-              </a:defRPr>
-            </a:lvl5pPr>
-            <a:lvl6pPr marL="2286000" indent="0" algn="ctr" defTabSz="914400" rtl="0" eaLnBrk="1" latinLnBrk="0" hangingPunct="1">
-              <a:spcBef>
-                <a:spcPct val="20000"/>
-              </a:spcBef>
-              <a:buFont typeface="Arial" pitchFamily="34" charset="0"/>
-              <a:buNone/>
-              <a:defRPr sz="2400" kern="1200">
-                <a:solidFill>
-                  <a:schemeClr val="tx1">
-                    <a:tint val="75000"/>
-                  </a:schemeClr>
-                </a:solidFill>
-                <a:latin typeface="+mn-lt"/>
-                <a:ea typeface="+mn-ea"/>
-                <a:cs typeface="+mn-cs"/>
-              </a:defRPr>
-            </a:lvl6pPr>
-            <a:lvl7pPr marL="2743200" indent="0" algn="ctr" defTabSz="914400" rtl="0" eaLnBrk="1" latinLnBrk="0" hangingPunct="1">
-              <a:spcBef>
-                <a:spcPct val="20000"/>
-              </a:spcBef>
-              <a:buFont typeface="Arial" pitchFamily="34" charset="0"/>
-              <a:buNone/>
-              <a:defRPr sz="2000" kern="1200">
-                <a:solidFill>
-                  <a:schemeClr val="tx1">
-                    <a:tint val="75000"/>
-                  </a:schemeClr>
-                </a:solidFill>
-                <a:latin typeface="+mn-lt"/>
-                <a:ea typeface="+mn-ea"/>
-                <a:cs typeface="+mn-cs"/>
-              </a:defRPr>
-            </a:lvl7pPr>
-            <a:lvl8pPr marL="3200400" indent="0" algn="ctr" defTabSz="914400" rtl="0" eaLnBrk="1" latinLnBrk="0" hangingPunct="1">
-              <a:spcBef>
-                <a:spcPct val="20000"/>
-              </a:spcBef>
-              <a:buFont typeface="Arial" pitchFamily="34" charset="0"/>
-              <a:buNone/>
-              <a:defRPr sz="2000" kern="1200">
-                <a:solidFill>
-                  <a:schemeClr val="tx1">
-                    <a:tint val="75000"/>
-                  </a:schemeClr>
-                </a:solidFill>
-                <a:latin typeface="+mn-lt"/>
-                <a:ea typeface="+mn-ea"/>
-                <a:cs typeface="+mn-cs"/>
-              </a:defRPr>
-            </a:lvl8pPr>
-            <a:lvl9pPr marL="3657600" indent="0" algn="ctr" defTabSz="914400" rtl="0" eaLnBrk="1" latinLnBrk="0" hangingPunct="1">
-              <a:spcBef>
-                <a:spcPct val="20000"/>
-              </a:spcBef>
-              <a:buFont typeface="Arial" pitchFamily="34" charset="0"/>
-              <a:buNone/>
-              <a:defRPr sz="2000" kern="1200">
-                <a:solidFill>
-                  <a:schemeClr val="tx1">
-                    <a:tint val="75000"/>
-                  </a:schemeClr>
-                </a:solidFill>
-                <a:latin typeface="+mn-lt"/>
-                <a:ea typeface="+mn-ea"/>
-                <a:cs typeface="+mn-cs"/>
-              </a:defRPr>
-            </a:lvl9pPr>
-          </a:lstStyle>
-          <a:p>
-            <a:pPr>
-              <a:defRPr/>
-            </a:pPr>
-            <a:r>
-              <a:rPr lang="en-GB" dirty="0">
-                <a:solidFill>
-                  <a:srgbClr val="E30613"/>
-                </a:solidFill>
-                <a:latin typeface="Arial"/>
-                <a:cs typeface="Arial"/>
-              </a:rPr>
-              <a:t>Wandrille Duchemin</a:t>
-            </a:r>
-            <a:endParaRPr lang="en-US" dirty="0">
-              <a:latin typeface="Arial"/>
-              <a:cs typeface="Arial"/>
-            </a:endParaRPr>
-          </a:p>
-          <a:p>
-            <a:pPr marL="0" marR="0" lvl="0" indent="0" algn="l" defTabSz="914400" rtl="0" eaLnBrk="1" fontAlgn="auto" latinLnBrk="0" hangingPunct="1">
-              <a:lnSpc>
-                <a:spcPct val="100000"/>
-              </a:lnSpc>
-              <a:spcBef>
-                <a:spcPts val="1200"/>
-              </a:spcBef>
-              <a:spcAft>
-                <a:spcPts val="0"/>
-              </a:spcAft>
-              <a:buClrTx/>
-              <a:buSzTx/>
-              <a:buFont typeface="Arial" pitchFamily="34" charset="0"/>
-              <a:buNone/>
-              <a:tabLst/>
-              <a:defRPr/>
-            </a:pPr>
-            <a:r>
-              <a:rPr kumimoji="0" lang="en-GB" sz="2800" b="0" i="0" u="none" strike="noStrike" kern="1200" cap="none" spc="0" normalizeH="0" baseline="0" noProof="0" dirty="0">
-                <a:ln>
-                  <a:noFill/>
-                </a:ln>
-                <a:solidFill>
-                  <a:srgbClr val="E30613"/>
-                </a:solidFill>
-                <a:effectLst>
-                  <a:outerShdw blurRad="38100" dist="12700" dir="2700000" algn="ctr" rotWithShape="0">
-                    <a:srgbClr val="000000">
-                      <a:alpha val="43137"/>
-                    </a:srgbClr>
-                  </a:outerShdw>
-                </a:effectLst>
-                <a:uLnTx/>
-                <a:uFillTx/>
-                <a:latin typeface="Arial" pitchFamily="34" charset="0"/>
-                <a:ea typeface="+mn-ea"/>
-                <a:cs typeface="Arial" pitchFamily="34" charset="0"/>
-              </a:rPr>
-              <a:t> -- with slides from Diana Marek, Leonore Wigger, Wandrille Duchemin</a:t>
-            </a:r>
-          </a:p>
-          <a:p>
-            <a:pPr marL="0" marR="0" lvl="0" indent="0" algn="l" defTabSz="914400" rtl="0" eaLnBrk="1" fontAlgn="auto" latinLnBrk="0" hangingPunct="1">
-              <a:lnSpc>
-                <a:spcPct val="100000"/>
-              </a:lnSpc>
-              <a:spcBef>
-                <a:spcPts val="1200"/>
-              </a:spcBef>
-              <a:spcAft>
-                <a:spcPts val="0"/>
-              </a:spcAft>
-              <a:buClrTx/>
-              <a:buSzTx/>
-              <a:buFont typeface="Arial" pitchFamily="34" charset="0"/>
-              <a:buNone/>
-              <a:tabLst/>
-              <a:defRPr/>
-            </a:pPr>
-            <a:endParaRPr kumimoji="0" lang="en-GB" sz="2800" b="0" i="0" u="none" strike="noStrike" kern="1200" cap="none" spc="0" normalizeH="0" baseline="0" noProof="0" dirty="0">
-              <a:ln>
-                <a:noFill/>
-              </a:ln>
-              <a:solidFill>
-                <a:srgbClr val="E30613"/>
-              </a:solidFill>
-              <a:effectLst>
-                <a:outerShdw blurRad="38100" dist="12700" dir="2700000" algn="ctr" rotWithShape="0">
-                  <a:srgbClr val="000000">
-                    <a:alpha val="43137"/>
-                  </a:srgbClr>
-                </a:outerShdw>
-              </a:effectLst>
-              <a:uLnTx/>
-              <a:uFillTx/>
-              <a:latin typeface="Arial" pitchFamily="34" charset="0"/>
-              <a:ea typeface="+mn-ea"/>
-              <a:cs typeface="Arial" pitchFamily="34" charset="0"/>
-            </a:endParaRPr>
-          </a:p>
-          <a:p>
-            <a:pPr marL="0" marR="0" lvl="0" indent="0" algn="l" defTabSz="914400" rtl="0" eaLnBrk="1" fontAlgn="auto" latinLnBrk="0" hangingPunct="1">
-              <a:lnSpc>
-                <a:spcPct val="100000"/>
-              </a:lnSpc>
-              <a:spcBef>
-                <a:spcPts val="1200"/>
-              </a:spcBef>
-              <a:spcAft>
-                <a:spcPts val="0"/>
-              </a:spcAft>
-              <a:buClrTx/>
-              <a:buSzTx/>
-              <a:buFont typeface="Arial" pitchFamily="34" charset="0"/>
-              <a:buNone/>
-              <a:tabLst/>
-              <a:defRPr/>
-            </a:pPr>
-            <a:endParaRPr kumimoji="0" lang="en-GB" sz="2800" b="0" i="0" u="none" strike="noStrike" kern="1200" cap="none" spc="0" normalizeH="0" baseline="0" noProof="0" dirty="0">
-              <a:ln>
-                <a:noFill/>
-              </a:ln>
-              <a:solidFill>
-                <a:srgbClr val="E30613"/>
-              </a:solidFill>
-              <a:effectLst>
-                <a:outerShdw blurRad="38100" dist="12700" dir="2700000" algn="ctr" rotWithShape="0">
-                  <a:srgbClr val="000000">
-                    <a:alpha val="43137"/>
-                  </a:srgbClr>
-                </a:outerShdw>
-              </a:effectLst>
-              <a:uLnTx/>
-              <a:uFillTx/>
-              <a:latin typeface="Arial" pitchFamily="34" charset="0"/>
-              <a:ea typeface="+mn-ea"/>
-              <a:cs typeface="Arial" pitchFamily="34" charset="0"/>
-            </a:endParaRPr>
-          </a:p>
-        </p:txBody>
-      </p:sp>
-      <p:sp>
-        <p:nvSpPr>
           <p:cNvPr id="2" name="Titre 1"/>
           <p:cNvSpPr>
             <a:spLocks noGrp="1"/>
@@ -24283,6 +23937,287 @@
           </a:fontRef>
         </p:style>
       </p:cxnSp>
+      <p:sp>
+        <p:nvSpPr>
+          <p:cNvPr id="3" name="Sous-titre 4">
+            <a:extLst>
+              <a:ext uri="{FF2B5EF4-FFF2-40B4-BE49-F238E27FC236}">
+                <a16:creationId xmlns:a16="http://schemas.microsoft.com/office/drawing/2014/main" id="{E4771ABD-7814-720B-7D87-917A5A0895CB}"/>
+              </a:ext>
+            </a:extLst>
+          </p:cNvPr>
+          <p:cNvSpPr txBox="1">
+            <a:spLocks/>
+          </p:cNvSpPr>
+          <p:nvPr/>
+        </p:nvSpPr>
+        <p:spPr>
+          <a:xfrm>
+            <a:off x="504000" y="5297400"/>
+            <a:ext cx="8100000" cy="866130"/>
+          </a:xfrm>
+          <a:prstGeom prst="rect">
+            <a:avLst/>
+          </a:prstGeom>
+        </p:spPr>
+        <p:txBody>
+          <a:bodyPr vert="horz" lIns="0" tIns="0" rIns="0" bIns="0" rtlCol="0" anchor="t">
+            <a:normAutofit fontScale="70000" lnSpcReduction="20000"/>
+          </a:bodyPr>
+          <a:lstStyle>
+            <a:lvl1pPr marL="0" indent="0" algn="l" defTabSz="914400" rtl="0" eaLnBrk="1" latinLnBrk="0" hangingPunct="1">
+              <a:spcBef>
+                <a:spcPts val="1200"/>
+              </a:spcBef>
+              <a:buFont typeface="Arial" pitchFamily="34" charset="0"/>
+              <a:buNone/>
+              <a:defRPr sz="2800" kern="1200">
+                <a:solidFill>
+                  <a:schemeClr val="accent1"/>
+                </a:solidFill>
+                <a:effectLst>
+                  <a:outerShdw blurRad="38100" dist="12700" dir="2700000" algn="ctr" rotWithShape="0">
+                    <a:srgbClr val="000000">
+                      <a:alpha val="43137"/>
+                    </a:srgbClr>
+                  </a:outerShdw>
+                </a:effectLst>
+                <a:latin typeface="Arial" pitchFamily="34" charset="0"/>
+                <a:ea typeface="+mn-ea"/>
+                <a:cs typeface="Arial" pitchFamily="34" charset="0"/>
+              </a:defRPr>
+            </a:lvl1pPr>
+            <a:lvl2pPr marL="457200" indent="0" algn="ctr" defTabSz="914400" rtl="0" eaLnBrk="1" latinLnBrk="0" hangingPunct="1">
+              <a:spcBef>
+                <a:spcPts val="2400"/>
+              </a:spcBef>
+              <a:buSzPct val="110000"/>
+              <a:buFontTx/>
+              <a:buNone/>
+              <a:defRPr sz="2400" b="1" kern="1200">
+                <a:solidFill>
+                  <a:schemeClr val="tx1">
+                    <a:tint val="75000"/>
+                  </a:schemeClr>
+                </a:solidFill>
+                <a:effectLst>
+                  <a:outerShdw blurRad="38100" dist="12700" dir="2700000" algn="ctr" rotWithShape="0">
+                    <a:srgbClr val="000000">
+                      <a:alpha val="43137"/>
+                    </a:srgbClr>
+                  </a:outerShdw>
+                </a:effectLst>
+                <a:latin typeface="Arial" pitchFamily="34" charset="0"/>
+                <a:ea typeface="+mn-ea"/>
+                <a:cs typeface="Arial" pitchFamily="34" charset="0"/>
+              </a:defRPr>
+            </a:lvl2pPr>
+            <a:lvl3pPr marL="914400" indent="0" algn="ctr" defTabSz="914400" rtl="0" eaLnBrk="1" latinLnBrk="0" hangingPunct="1">
+              <a:spcBef>
+                <a:spcPts val="0"/>
+              </a:spcBef>
+              <a:buFontTx/>
+              <a:buNone/>
+              <a:defRPr lang="fr-FR" sz="2400" kern="1200">
+                <a:solidFill>
+                  <a:schemeClr val="tx1">
+                    <a:tint val="75000"/>
+                  </a:schemeClr>
+                </a:solidFill>
+                <a:effectLst>
+                  <a:outerShdw blurRad="38100" dist="12700" dir="2700000" algn="ctr" rotWithShape="0">
+                    <a:srgbClr val="000000">
+                      <a:alpha val="43137"/>
+                    </a:srgbClr>
+                  </a:outerShdw>
+                </a:effectLst>
+                <a:latin typeface="Arial" pitchFamily="34" charset="0"/>
+                <a:ea typeface="+mn-ea"/>
+                <a:cs typeface="Arial" pitchFamily="34" charset="0"/>
+              </a:defRPr>
+            </a:lvl3pPr>
+            <a:lvl4pPr marL="1371600" indent="0" algn="ctr" defTabSz="914400" rtl="0" eaLnBrk="1" latinLnBrk="0" hangingPunct="1">
+              <a:spcBef>
+                <a:spcPts val="0"/>
+              </a:spcBef>
+              <a:buFontTx/>
+              <a:buNone/>
+              <a:defRPr sz="2400" b="0" kern="1200">
+                <a:solidFill>
+                  <a:schemeClr val="tx1">
+                    <a:tint val="75000"/>
+                  </a:schemeClr>
+                </a:solidFill>
+                <a:latin typeface="Arial" pitchFamily="34" charset="0"/>
+                <a:ea typeface="+mn-ea"/>
+                <a:cs typeface="Arial" pitchFamily="34" charset="0"/>
+              </a:defRPr>
+            </a:lvl4pPr>
+            <a:lvl5pPr marL="1828800" indent="0" algn="ctr" defTabSz="914400" rtl="0" eaLnBrk="1" latinLnBrk="0" hangingPunct="1">
+              <a:spcBef>
+                <a:spcPts val="0"/>
+              </a:spcBef>
+              <a:buFont typeface="Arial" pitchFamily="34" charset="0"/>
+              <a:buNone/>
+              <a:defRPr sz="2400" kern="1200">
+                <a:solidFill>
+                  <a:schemeClr val="tx1">
+                    <a:tint val="75000"/>
+                  </a:schemeClr>
+                </a:solidFill>
+                <a:latin typeface="Arial" pitchFamily="34" charset="0"/>
+                <a:ea typeface="+mn-ea"/>
+                <a:cs typeface="Arial" pitchFamily="34" charset="0"/>
+              </a:defRPr>
+            </a:lvl5pPr>
+            <a:lvl6pPr marL="2286000" indent="0" algn="ctr" defTabSz="914400" rtl="0" eaLnBrk="1" latinLnBrk="0" hangingPunct="1">
+              <a:spcBef>
+                <a:spcPct val="20000"/>
+              </a:spcBef>
+              <a:buFont typeface="Arial" pitchFamily="34" charset="0"/>
+              <a:buNone/>
+              <a:defRPr sz="2400" kern="1200">
+                <a:solidFill>
+                  <a:schemeClr val="tx1">
+                    <a:tint val="75000"/>
+                  </a:schemeClr>
+                </a:solidFill>
+                <a:latin typeface="+mn-lt"/>
+                <a:ea typeface="+mn-ea"/>
+                <a:cs typeface="+mn-cs"/>
+              </a:defRPr>
+            </a:lvl6pPr>
+            <a:lvl7pPr marL="2743200" indent="0" algn="ctr" defTabSz="914400" rtl="0" eaLnBrk="1" latinLnBrk="0" hangingPunct="1">
+              <a:spcBef>
+                <a:spcPct val="20000"/>
+              </a:spcBef>
+              <a:buFont typeface="Arial" pitchFamily="34" charset="0"/>
+              <a:buNone/>
+              <a:defRPr sz="2000" kern="1200">
+                <a:solidFill>
+                  <a:schemeClr val="tx1">
+                    <a:tint val="75000"/>
+                  </a:schemeClr>
+                </a:solidFill>
+                <a:latin typeface="+mn-lt"/>
+                <a:ea typeface="+mn-ea"/>
+                <a:cs typeface="+mn-cs"/>
+              </a:defRPr>
+            </a:lvl7pPr>
+            <a:lvl8pPr marL="3200400" indent="0" algn="ctr" defTabSz="914400" rtl="0" eaLnBrk="1" latinLnBrk="0" hangingPunct="1">
+              <a:spcBef>
+                <a:spcPct val="20000"/>
+              </a:spcBef>
+              <a:buFont typeface="Arial" pitchFamily="34" charset="0"/>
+              <a:buNone/>
+              <a:defRPr sz="2000" kern="1200">
+                <a:solidFill>
+                  <a:schemeClr val="tx1">
+                    <a:tint val="75000"/>
+                  </a:schemeClr>
+                </a:solidFill>
+                <a:latin typeface="+mn-lt"/>
+                <a:ea typeface="+mn-ea"/>
+                <a:cs typeface="+mn-cs"/>
+              </a:defRPr>
+            </a:lvl8pPr>
+            <a:lvl9pPr marL="3657600" indent="0" algn="ctr" defTabSz="914400" rtl="0" eaLnBrk="1" latinLnBrk="0" hangingPunct="1">
+              <a:spcBef>
+                <a:spcPct val="20000"/>
+              </a:spcBef>
+              <a:buFont typeface="Arial" pitchFamily="34" charset="0"/>
+              <a:buNone/>
+              <a:defRPr sz="2000" kern="1200">
+                <a:solidFill>
+                  <a:schemeClr val="tx1">
+                    <a:tint val="75000"/>
+                  </a:schemeClr>
+                </a:solidFill>
+                <a:latin typeface="+mn-lt"/>
+                <a:ea typeface="+mn-ea"/>
+                <a:cs typeface="+mn-cs"/>
+              </a:defRPr>
+            </a:lvl9pPr>
+          </a:lstStyle>
+          <a:p>
+            <a:r>
+              <a:rPr lang="fr-FR" dirty="0">
+                <a:latin typeface="Arial"/>
+                <a:cs typeface="Arial"/>
+              </a:rPr>
+              <a:t>Diana Marek &amp; Thomas </a:t>
+            </a:r>
+            <a:r>
+              <a:rPr lang="fr-FR" dirty="0" err="1">
+                <a:latin typeface="Arial"/>
+                <a:cs typeface="Arial"/>
+              </a:rPr>
+              <a:t>Junier</a:t>
+            </a:r>
+            <a:endParaRPr lang="en-US" dirty="0">
+              <a:latin typeface="Arial"/>
+              <a:cs typeface="Arial"/>
+            </a:endParaRPr>
+          </a:p>
+          <a:p>
+            <a:r>
+              <a:rPr lang="en-GB" dirty="0">
+                <a:latin typeface="Arial"/>
+                <a:cs typeface="Arial"/>
+              </a:rPr>
+              <a:t> -- with slides from </a:t>
+            </a:r>
+            <a:r>
+              <a:rPr lang="en-GB" dirty="0" err="1">
+                <a:latin typeface="Arial"/>
+                <a:cs typeface="Arial"/>
+              </a:rPr>
+              <a:t>Wandrille</a:t>
+            </a:r>
+            <a:r>
+              <a:rPr lang="en-GB" dirty="0">
+                <a:latin typeface="Arial"/>
+                <a:cs typeface="Arial"/>
+              </a:rPr>
+              <a:t> </a:t>
+            </a:r>
+            <a:r>
+              <a:rPr lang="en-GB" dirty="0" err="1">
+                <a:latin typeface="Arial"/>
+                <a:cs typeface="Arial"/>
+              </a:rPr>
+              <a:t>Duchemin</a:t>
+            </a:r>
+            <a:r>
+              <a:rPr lang="en-GB" dirty="0">
+                <a:latin typeface="Arial"/>
+                <a:cs typeface="Arial"/>
+              </a:rPr>
+              <a:t>, </a:t>
+            </a:r>
+            <a:r>
+              <a:rPr lang="en-GB" dirty="0" err="1">
+                <a:latin typeface="Arial"/>
+                <a:cs typeface="Arial"/>
+              </a:rPr>
+              <a:t>Leonore</a:t>
+            </a:r>
+            <a:r>
+              <a:rPr lang="en-GB" dirty="0">
+                <a:latin typeface="Arial"/>
+                <a:cs typeface="Arial"/>
+              </a:rPr>
+              <a:t> Wigger, Diana Marek</a:t>
+            </a:r>
+          </a:p>
+          <a:p>
+            <a:endParaRPr lang="en-GB" dirty="0"/>
+          </a:p>
+          <a:p>
+            <a:endParaRPr lang="en-GB" dirty="0"/>
+          </a:p>
+        </p:txBody>
+      </p:sp>
     </p:spTree>
     <p:extLst>
       <p:ext uri="{BB962C8B-B14F-4D97-AF65-F5344CB8AC3E}">
@@ -29051,7 +28986,7 @@
               </a:spcBef>
             </a:pPr>
             <a:r>
-              <a:rPr lang="en-US" sz="2800" b="0" strike="noStrike" spc="-1">
+              <a:rPr lang="en-US" sz="2800" b="0" strike="noStrike" spc="-1" dirty="0">
                 <a:solidFill>
                   <a:srgbClr val="000000"/>
                 </a:solidFill>
@@ -29061,7 +28996,7 @@
               <a:t>Sleep data set has </a:t>
             </a:r>
             <a:r>
-              <a:rPr lang="en-US" sz="2800" b="0" strike="noStrike" spc="-1">
+              <a:rPr lang="en-US" sz="2800" b="0" strike="noStrike" spc="-1" dirty="0">
                 <a:solidFill>
                   <a:srgbClr val="4E81BD"/>
                 </a:solidFill>
@@ -29071,7 +29006,7 @@
               <a:t>two measurements per person (ID): </a:t>
             </a:r>
             <a:r>
-              <a:rPr lang="en-US" sz="2800" b="0" strike="noStrike" spc="-1">
+              <a:rPr lang="en-US" sz="2800" b="0" strike="noStrike" spc="-1" dirty="0">
                 <a:solidFill>
                   <a:srgbClr val="000000"/>
                 </a:solidFill>
@@ -29080,7 +29015,7 @@
               </a:rPr>
               <a:t>one for each drug. </a:t>
             </a:r>
-            <a:endParaRPr lang="en-US" sz="2800" b="0" strike="noStrike" spc="-1">
+            <a:endParaRPr lang="en-US" sz="2800" b="0" strike="noStrike" spc="-1" dirty="0">
               <a:latin typeface="Arial"/>
             </a:endParaRPr>
           </a:p>
@@ -29094,7 +29029,7 @@
               </a:spcBef>
             </a:pPr>
             <a:r>
-              <a:rPr lang="en-US" sz="2800" b="0" strike="noStrike" spc="-1">
+              <a:rPr lang="en-US" sz="2800" b="0" strike="noStrike" spc="-1" dirty="0">
                 <a:solidFill>
                   <a:srgbClr val="000000"/>
                 </a:solidFill>
@@ -29104,7 +29039,7 @@
               <a:t>A </a:t>
             </a:r>
             <a:r>
-              <a:rPr lang="en-US" sz="2800" b="0" strike="noStrike" spc="-1">
+              <a:rPr lang="en-US" sz="2800" b="0" strike="noStrike" spc="-1" dirty="0">
                 <a:solidFill>
                   <a:srgbClr val="4E81BD"/>
                 </a:solidFill>
@@ -29114,7 +29049,7 @@
               <a:t>paired t-test </a:t>
             </a:r>
             <a:r>
-              <a:rPr lang="en-US" sz="2800" b="0" strike="noStrike" spc="-1">
+              <a:rPr lang="en-US" sz="2800" b="0" strike="noStrike" spc="-1" dirty="0">
                 <a:solidFill>
                   <a:srgbClr val="000000"/>
                 </a:solidFill>
@@ -29123,7 +29058,7 @@
               </a:rPr>
               <a:t>would be more appropriate than an unpaired t-test.</a:t>
             </a:r>
-            <a:endParaRPr lang="en-US" sz="2800" b="0" strike="noStrike" spc="-1">
+            <a:endParaRPr lang="en-US" sz="2800" b="0" strike="noStrike" spc="-1" dirty="0">
               <a:latin typeface="Arial"/>
             </a:endParaRPr>
           </a:p>
@@ -29136,7 +29071,7 @@
                 <a:spcPts val="561"/>
               </a:spcBef>
             </a:pPr>
-            <a:endParaRPr lang="en-US" sz="2800" b="0" strike="noStrike" spc="-1">
+            <a:endParaRPr lang="en-US" sz="2800" b="0" strike="noStrike" spc="-1" dirty="0">
               <a:latin typeface="Arial"/>
             </a:endParaRPr>
           </a:p>
@@ -29150,7 +29085,7 @@
               </a:spcBef>
             </a:pPr>
             <a:r>
-              <a:rPr lang="en-US" sz="2800" b="1" strike="noStrike" spc="-1">
+              <a:rPr lang="en-US" sz="2800" b="1" strike="noStrike" spc="-1" dirty="0">
                 <a:solidFill>
                   <a:srgbClr val="000000"/>
                 </a:solidFill>
@@ -29159,7 +29094,7 @@
               </a:rPr>
               <a:t>Normality assumption: </a:t>
             </a:r>
-            <a:endParaRPr lang="en-US" sz="2800" b="0" strike="noStrike" spc="-1">
+            <a:endParaRPr lang="en-US" sz="2800" b="0" strike="noStrike" spc="-1" dirty="0">
               <a:latin typeface="Arial"/>
             </a:endParaRPr>
           </a:p>
@@ -29178,17 +29113,17 @@
               <a:buChar char="•"/>
             </a:pPr>
             <a:r>
-              <a:rPr lang="en-US" sz="2400" b="0" strike="noStrike" spc="-1">
+              <a:rPr lang="en-US" sz="2400" b="0" strike="noStrike" spc="-1" dirty="0">
                 <a:solidFill>
                   <a:srgbClr val="4E81BD"/>
                 </a:solidFill>
                 <a:latin typeface="Calibri"/>
                 <a:ea typeface="DejaVu Sans"/>
               </a:rPr>
-              <a:t>The mean of the </a:t>
-            </a:r>
-            <a:r>
-              <a:rPr lang="en-US" sz="2400" b="1" strike="noStrike" spc="-1">
+              <a:t>The </a:t>
+            </a:r>
+            <a:r>
+              <a:rPr lang="en-US" sz="2400" b="1" strike="noStrike" spc="-1" dirty="0">
                 <a:solidFill>
                   <a:srgbClr val="4E81BD"/>
                 </a:solidFill>
@@ -29198,7 +29133,7 @@
               <a:t>differences</a:t>
             </a:r>
             <a:r>
-              <a:rPr lang="en-US" sz="2400" b="0" strike="noStrike" spc="-1">
+              <a:rPr lang="en-US" sz="2400" b="0" strike="noStrike" spc="-1" dirty="0">
                 <a:solidFill>
                   <a:srgbClr val="4E81BD"/>
                 </a:solidFill>
@@ -29208,7 +29143,7 @@
               <a:t> between pairs </a:t>
             </a:r>
             <a:r>
-              <a:rPr lang="en-US" sz="2400" b="0" strike="noStrike" spc="-1">
+              <a:rPr lang="en-US" sz="2400" b="0" strike="noStrike" spc="-1" dirty="0">
                 <a:solidFill>
                   <a:srgbClr val="000000"/>
                 </a:solidFill>
@@ -29217,7 +29152,7 @@
               </a:rPr>
               <a:t>are normally distributed. </a:t>
             </a:r>
-            <a:endParaRPr lang="en-US" sz="2400" b="0" strike="noStrike" spc="-1">
+            <a:endParaRPr lang="en-US" sz="2400" b="0" strike="noStrike" spc="-1" dirty="0">
               <a:latin typeface="Arial"/>
             </a:endParaRPr>
           </a:p>
@@ -30136,7 +30071,7 @@
                 <a:spcPct val="100000"/>
               </a:lnSpc>
             </a:pPr>
-            <a:endParaRPr lang="en-US" sz="1600" b="0" strike="noStrike" spc="-1">
+            <a:endParaRPr lang="en-US" sz="1600" b="0" strike="noStrike" spc="-1" dirty="0">
               <a:latin typeface="Arial"/>
             </a:endParaRPr>
           </a:p>
@@ -30206,7 +30141,7 @@
                 <a:spcPct val="100000"/>
               </a:lnSpc>
             </a:pPr>
-            <a:endParaRPr lang="en-US" sz="1600" b="0" strike="noStrike" spc="-1">
+            <a:endParaRPr lang="en-US" sz="1600" b="0" strike="noStrike" spc="-1" dirty="0">
               <a:latin typeface="Arial"/>
             </a:endParaRPr>
           </a:p>
@@ -30244,47 +30179,7 @@
                 <a:latin typeface="Lucida Console"/>
                 <a:ea typeface="Courier New"/>
               </a:rPr>
-              <a:t>(difference, </a:t>
-            </a:r>
-            <a:r>
-              <a:rPr lang="en-US" sz="1600" b="0" strike="noStrike" spc="-1" dirty="0" err="1">
-                <a:solidFill>
-                  <a:srgbClr val="4F81BD"/>
-                </a:solidFill>
-                <a:latin typeface="Lucida Console"/>
-                <a:ea typeface="Courier New"/>
-              </a:rPr>
-              <a:t>xlim</a:t>
-            </a:r>
-            <a:r>
-              <a:rPr lang="en-US" sz="1600" b="0" strike="noStrike" spc="-1" dirty="0">
-                <a:solidFill>
-                  <a:srgbClr val="4F81BD"/>
-                </a:solidFill>
-                <a:latin typeface="Lucida Console"/>
-                <a:ea typeface="Courier New"/>
-              </a:rPr>
-              <a:t>=c(-5, 2), </a:t>
-            </a:r>
-            <a:r>
-              <a:rPr lang="en-US" sz="1600" b="0" strike="noStrike" spc="-1" dirty="0" err="1">
-                <a:solidFill>
-                  <a:srgbClr val="4F81BD"/>
-                </a:solidFill>
-                <a:latin typeface="Lucida Console"/>
-                <a:ea typeface="Courier New"/>
-              </a:rPr>
-              <a:t>ylim</a:t>
-            </a:r>
-            <a:r>
-              <a:rPr lang="en-US" sz="1600" b="0" strike="noStrike" spc="-1" dirty="0">
-                <a:solidFill>
-                  <a:srgbClr val="4F81BD"/>
-                </a:solidFill>
-                <a:latin typeface="Lucida Console"/>
-                <a:ea typeface="Courier New"/>
-              </a:rPr>
-              <a:t>=c(-5, 2))</a:t>
+              <a:t>(difference)</a:t>
             </a:r>
             <a:endParaRPr lang="en-US" sz="1600" b="0" strike="noStrike" spc="-1" dirty="0">
               <a:latin typeface="Arial"/>
@@ -40061,7 +39956,7 @@
                 <a:spcPts val="1001"/>
               </a:spcBef>
             </a:pPr>
-            <a:endParaRPr lang="en-US" sz="1800" b="0" strike="noStrike" spc="-1">
+            <a:endParaRPr lang="en-US" sz="1800" b="0" strike="noStrike" spc="-1" dirty="0">
               <a:latin typeface="Arial"/>
             </a:endParaRPr>
           </a:p>
@@ -40075,7 +39970,7 @@
               </a:spcBef>
             </a:pPr>
             <a:r>
-              <a:rPr lang="en-US" sz="2200" b="1" strike="noStrike" spc="-1">
+              <a:rPr lang="en-US" sz="2200" b="1" strike="noStrike" spc="-1" dirty="0">
                 <a:solidFill>
                   <a:srgbClr val="262626"/>
                 </a:solidFill>
@@ -40085,7 +39980,7 @@
               <a:t>Goal: </a:t>
             </a:r>
             <a:r>
-              <a:rPr lang="en-US" sz="2200" b="0" strike="noStrike" spc="-1">
+              <a:rPr lang="en-US" sz="2200" b="0" strike="noStrike" spc="-1" dirty="0">
                 <a:solidFill>
                   <a:srgbClr val="262626"/>
                 </a:solidFill>
@@ -40095,7 +39990,7 @@
               <a:t>Determine </a:t>
             </a:r>
             <a:r>
-              <a:rPr lang="en-US" sz="2200" b="0" strike="noStrike" spc="-1">
+              <a:rPr lang="en-US" sz="2200" b="0" strike="noStrike" spc="-1" dirty="0">
                 <a:solidFill>
                   <a:srgbClr val="000000"/>
                 </a:solidFill>
@@ -40105,7 +40000,7 @@
               <a:t>the extent to which there is a </a:t>
             </a:r>
             <a:r>
-              <a:rPr lang="en-US" sz="2200" b="0" strike="noStrike" spc="-1">
+              <a:rPr lang="en-US" sz="2200" b="0" strike="noStrike" spc="-1" dirty="0">
                 <a:solidFill>
                   <a:srgbClr val="4E81BD"/>
                 </a:solidFill>
@@ -40115,7 +40010,7 @@
               <a:t>linear relationship </a:t>
             </a:r>
             <a:r>
-              <a:rPr lang="en-US" sz="2200" b="0" strike="noStrike" spc="-1">
+              <a:rPr lang="en-US" sz="2200" b="0" strike="noStrike" spc="-1" dirty="0">
                 <a:solidFill>
                   <a:srgbClr val="000000"/>
                 </a:solidFill>
@@ -40125,7 +40020,7 @@
               <a:t>between an </a:t>
             </a:r>
             <a:r>
-              <a:rPr lang="en-US" sz="2200" b="0" strike="noStrike" spc="-1">
+              <a:rPr lang="en-US" sz="2200" b="0" strike="noStrike" spc="-1" dirty="0">
                 <a:solidFill>
                   <a:srgbClr val="4E81BD"/>
                 </a:solidFill>
@@ -40135,7 +40030,7 @@
               <a:t>"outcome" variable</a:t>
             </a:r>
             <a:r>
-              <a:rPr lang="en-US" sz="2200" b="0" strike="noStrike" spc="-1">
+              <a:rPr lang="en-US" sz="2200" b="0" strike="noStrike" spc="-1" dirty="0">
                 <a:solidFill>
                   <a:srgbClr val="000000"/>
                 </a:solidFill>
@@ -40145,7 +40040,7 @@
               <a:t> (dependent variable) and one  more </a:t>
             </a:r>
             <a:r>
-              <a:rPr lang="en-US" sz="2200" b="0" strike="noStrike" spc="-1">
+              <a:rPr lang="en-US" sz="2200" b="0" strike="noStrike" spc="-1" dirty="0">
                 <a:solidFill>
                   <a:srgbClr val="4E81BD"/>
                 </a:solidFill>
@@ -40155,7 +40050,7 @@
               <a:t>"explanatory" variables </a:t>
             </a:r>
             <a:r>
-              <a:rPr lang="en-US" sz="2200" b="0" strike="noStrike" spc="-1">
+              <a:rPr lang="en-US" sz="2200" b="0" strike="noStrike" spc="-1" dirty="0">
                 <a:solidFill>
                   <a:srgbClr val="000000"/>
                 </a:solidFill>
@@ -40164,7 +40059,7 @@
               </a:rPr>
               <a:t>(independent variables, predictor variables).</a:t>
             </a:r>
-            <a:endParaRPr lang="en-US" sz="2200" b="0" strike="noStrike" spc="-1">
+            <a:endParaRPr lang="en-US" sz="2200" b="0" strike="noStrike" spc="-1" dirty="0">
               <a:latin typeface="Arial"/>
             </a:endParaRPr>
           </a:p>
@@ -40178,7 +40073,7 @@
               </a:spcBef>
             </a:pPr>
             <a:r>
-              <a:rPr lang="en-US" sz="2200" b="0" strike="noStrike" spc="-1">
+              <a:rPr lang="en-US" sz="2200" b="0" strike="noStrike" spc="-1" dirty="0">
                 <a:solidFill>
                   <a:srgbClr val="000000"/>
                 </a:solidFill>
@@ -40187,7 +40082,7 @@
               </a:rPr>
               <a:t>Can a significant part of the variability in the outcome be predicted/explained by the independent variables?</a:t>
             </a:r>
-            <a:endParaRPr lang="en-US" sz="2200" b="0" strike="noStrike" spc="-1">
+            <a:endParaRPr lang="en-US" sz="2200" b="0" strike="noStrike" spc="-1" dirty="0">
               <a:latin typeface="Arial"/>
             </a:endParaRPr>
           </a:p>
@@ -40200,7 +40095,7 @@
                 <a:spcPts val="1001"/>
               </a:spcBef>
             </a:pPr>
-            <a:endParaRPr lang="en-US" sz="2200" b="0" strike="noStrike" spc="-1">
+            <a:endParaRPr lang="en-US" sz="2200" b="0" strike="noStrike" spc="-1" dirty="0">
               <a:latin typeface="Arial"/>
             </a:endParaRPr>
           </a:p>
@@ -40214,7 +40109,7 @@
               </a:spcBef>
             </a:pPr>
             <a:r>
-              <a:rPr lang="en-US" sz="1800" b="0" strike="noStrike" spc="-1">
+              <a:rPr lang="en-US" sz="1800" b="0" strike="noStrike" spc="-1" dirty="0">
                 <a:solidFill>
                   <a:srgbClr val="000000"/>
                 </a:solidFill>
@@ -40223,7 +40118,7 @@
               </a:rPr>
               <a:t>	Outcome variable:  continuous (e.g. weight, heart rate, blood sugar)</a:t>
             </a:r>
-            <a:endParaRPr lang="en-US" sz="1800" b="0" strike="noStrike" spc="-1">
+            <a:endParaRPr lang="en-US" sz="1800" b="0" strike="noStrike" spc="-1" dirty="0">
               <a:latin typeface="Arial"/>
             </a:endParaRPr>
           </a:p>
@@ -40237,16 +40132,16 @@
               </a:spcBef>
             </a:pPr>
             <a:r>
-              <a:rPr lang="en-US" sz="1800" b="0" strike="noStrike" spc="-1">
+              <a:rPr lang="en-US" sz="1800" b="0" strike="noStrike" spc="-1" dirty="0">
                 <a:solidFill>
                   <a:srgbClr val="000000"/>
                 </a:solidFill>
                 <a:latin typeface="Calibri"/>
                 <a:ea typeface="DejaVu Sans"/>
               </a:rPr>
-              <a:t>	Explanatory variables: continuous OR categorical (e.g. gender)</a:t>
-            </a:r>
-            <a:endParaRPr lang="en-US" sz="1800" b="0" strike="noStrike" spc="-1">
+              <a:t>	Explanatory variables: continuous or (with adaptations) categorical</a:t>
+            </a:r>
+            <a:endParaRPr lang="en-US" sz="1800" b="0" strike="noStrike" spc="-1" dirty="0">
               <a:latin typeface="Arial"/>
             </a:endParaRPr>
           </a:p>
@@ -40259,12 +40154,42 @@
                 <a:spcPts val="1001"/>
               </a:spcBef>
             </a:pPr>
-            <a:endParaRPr lang="en-US" sz="1800" b="0" strike="noStrike" spc="-1">
-              <a:latin typeface="Arial"/>
-            </a:endParaRPr>
-          </a:p>
-          <a:p>
-            <a:pPr>
+            <a:r>
+              <a:rPr lang="en-US" sz="2200" b="0" strike="noStrike" spc="-1" dirty="0">
+                <a:solidFill>
+                  <a:srgbClr val="262626"/>
+                </a:solidFill>
+                <a:latin typeface="Calibri"/>
+                <a:ea typeface="DejaVu Sans"/>
+              </a:rPr>
+              <a:t>In R, the linear regression model is specified by </a:t>
+            </a:r>
+            <a:r>
+              <a:rPr lang="en-US" sz="2200" b="0" strike="noStrike" spc="-1" dirty="0">
+                <a:solidFill>
+                  <a:srgbClr val="4472C4"/>
+                </a:solidFill>
+                <a:latin typeface="Calibri"/>
+                <a:ea typeface="DejaVu Sans"/>
+              </a:rPr>
+              <a:t>a model formula </a:t>
+            </a:r>
+            <a:r>
+              <a:rPr lang="en-US" sz="2200" b="0" strike="noStrike" spc="-1" dirty="0">
+                <a:solidFill>
+                  <a:srgbClr val="262626"/>
+                </a:solidFill>
+                <a:latin typeface="Calibri"/>
+                <a:ea typeface="DejaVu Sans"/>
+              </a:rPr>
+              <a:t>of the form:</a:t>
+            </a:r>
+            <a:endParaRPr lang="en-US" sz="2200" b="0" strike="noStrike" spc="-1" dirty="0">
+              <a:latin typeface="Arial"/>
+            </a:endParaRPr>
+          </a:p>
+          <a:p>
+            <a:pPr algn="ctr">
               <a:lnSpc>
                 <a:spcPct val="90000"/>
               </a:lnSpc>
@@ -40273,41 +40198,21 @@
               </a:spcBef>
             </a:pPr>
             <a:r>
-              <a:rPr lang="en-US" sz="2200" b="0" strike="noStrike" spc="-1">
-                <a:solidFill>
-                  <a:srgbClr val="262626"/>
+              <a:rPr lang="en-US" sz="2200" b="0" i="1" strike="noStrike" spc="-1" dirty="0">
+                <a:solidFill>
+                  <a:srgbClr val="4F81BD"/>
                 </a:solidFill>
                 <a:latin typeface="Calibri"/>
                 <a:ea typeface="DejaVu Sans"/>
               </a:rPr>
-              <a:t>In R, the linear regression model is specified by </a:t>
-            </a:r>
-            <a:r>
-              <a:rPr lang="en-US" sz="2200" b="0" strike="noStrike" spc="-1">
-                <a:solidFill>
-                  <a:srgbClr val="4472C4"/>
-                </a:solidFill>
-                <a:latin typeface="Calibri"/>
-                <a:ea typeface="DejaVu Sans"/>
-              </a:rPr>
-              <a:t>a model formula </a:t>
-            </a:r>
-            <a:r>
-              <a:rPr lang="en-US" sz="2200" b="0" strike="noStrike" spc="-1">
-                <a:solidFill>
-                  <a:srgbClr val="262626"/>
-                </a:solidFill>
-                <a:latin typeface="Calibri"/>
-                <a:ea typeface="DejaVu Sans"/>
-              </a:rPr>
-              <a:t>of the form:</a:t>
-            </a:r>
-            <a:endParaRPr lang="en-US" sz="2200" b="0" strike="noStrike" spc="-1">
-              <a:latin typeface="Arial"/>
-            </a:endParaRPr>
-          </a:p>
-          <a:p>
-            <a:pPr algn="ctr">
+              <a:t>outcome ~ explanatory variables</a:t>
+            </a:r>
+            <a:endParaRPr lang="en-US" sz="2200" b="0" strike="noStrike" spc="-1" dirty="0">
+              <a:latin typeface="Arial"/>
+            </a:endParaRPr>
+          </a:p>
+          <a:p>
+            <a:pPr>
               <a:lnSpc>
                 <a:spcPct val="90000"/>
               </a:lnSpc>
@@ -40315,30 +40220,7 @@
                 <a:spcPts val="1001"/>
               </a:spcBef>
             </a:pPr>
-            <a:r>
-              <a:rPr lang="en-US" sz="2200" b="0" i="1" strike="noStrike" spc="-1">
-                <a:solidFill>
-                  <a:srgbClr val="4F81BD"/>
-                </a:solidFill>
-                <a:latin typeface="Calibri"/>
-                <a:ea typeface="DejaVu Sans"/>
-              </a:rPr>
-              <a:t>outcome ~ explanatory variables</a:t>
-            </a:r>
-            <a:endParaRPr lang="en-US" sz="2200" b="0" strike="noStrike" spc="-1">
-              <a:latin typeface="Arial"/>
-            </a:endParaRPr>
-          </a:p>
-          <a:p>
-            <a:pPr>
-              <a:lnSpc>
-                <a:spcPct val="90000"/>
-              </a:lnSpc>
-              <a:spcBef>
-                <a:spcPts val="1001"/>
-              </a:spcBef>
-            </a:pPr>
-            <a:endParaRPr lang="en-US" sz="2200" b="0" strike="noStrike" spc="-1">
+            <a:endParaRPr lang="en-US" sz="2200" b="0" strike="noStrike" spc="-1" dirty="0">
               <a:latin typeface="Arial"/>
             </a:endParaRPr>
           </a:p>
@@ -40565,7 +40447,7 @@
                                         <p:tgtEl>
                                           <p:spTgt spid="424">
                                             <p:txEl>
-                                              <p:pRg st="7" end="7"/>
+                                              <p:pRg st="6" end="6"/>
                                             </p:txEl>
                                           </p:spTgt>
                                         </p:tgtEl>
@@ -40810,7 +40692,7 @@
                                         <p:tgtEl>
                                           <p:spTgt spid="424">
                                             <p:txEl>
-                                              <p:pRg st="7" end="7"/>
+                                              <p:pRg st="6" end="6"/>
                                             </p:txEl>
                                           </p:spTgt>
                                         </p:tgtEl>
@@ -40841,7 +40723,7 @@
                                         <p:tgtEl>
                                           <p:spTgt spid="424">
                                             <p:txEl>
-                                              <p:pRg st="8" end="8"/>
+                                              <p:pRg st="7" end="7"/>
                                             </p:txEl>
                                           </p:spTgt>
                                         </p:tgtEl>
@@ -40953,7 +40835,7 @@
               <a:buChar char="•"/>
             </a:pPr>
             <a:r>
-              <a:rPr lang="en-US" sz="2000" b="0" strike="noStrike" spc="-1">
+              <a:rPr lang="en-US" sz="2000" b="0" strike="noStrike" spc="-1" dirty="0">
                 <a:solidFill>
                   <a:srgbClr val="262626"/>
                 </a:solidFill>
@@ -40962,7 +40844,7 @@
               </a:rPr>
               <a:t>A simple regression model (one explanatory variable) is specified by </a:t>
             </a:r>
-            <a:endParaRPr lang="en-US" sz="2000" b="0" strike="noStrike" spc="-1">
+            <a:endParaRPr lang="en-US" sz="2000" b="0" strike="noStrike" spc="-1" dirty="0">
               <a:latin typeface="Arial"/>
             </a:endParaRPr>
           </a:p>
@@ -40982,7 +40864,7 @@
               <a:buChar char=""/>
             </a:pPr>
             <a:r>
-              <a:rPr lang="en-US" sz="2000" b="0" strike="noStrike" spc="-1">
+              <a:rPr lang="en-US" sz="2000" b="0" strike="noStrike" spc="-1" dirty="0">
                 <a:solidFill>
                   <a:srgbClr val="4F81BD"/>
                 </a:solidFill>
@@ -40991,7 +40873,7 @@
               </a:rPr>
               <a:t>y = a + b*x+ err</a:t>
             </a:r>
-            <a:endParaRPr lang="en-US" sz="2000" b="0" strike="noStrike" spc="-1">
+            <a:endParaRPr lang="en-US" sz="2000" b="0" strike="noStrike" spc="-1" dirty="0">
               <a:latin typeface="Arial"/>
             </a:endParaRPr>
           </a:p>
@@ -41005,7 +40887,7 @@
               </a:spcBef>
             </a:pPr>
             <a:r>
-              <a:rPr lang="en-US" sz="2000" b="0" strike="noStrike" spc="-1">
+              <a:rPr lang="en-US" sz="2000" b="0" strike="noStrike" spc="-1" dirty="0">
                 <a:solidFill>
                   <a:srgbClr val="000000"/>
                 </a:solidFill>
@@ -41015,7 +40897,7 @@
               <a:t>	</a:t>
             </a:r>
             <a:r>
-              <a:rPr lang="en-US" sz="1500" b="0" strike="noStrike" spc="-1">
+              <a:rPr lang="en-US" sz="1500" b="0" strike="noStrike" spc="-1" dirty="0">
                 <a:solidFill>
                   <a:srgbClr val="000000"/>
                 </a:solidFill>
@@ -41024,7 +40906,7 @@
               </a:rPr>
               <a:t>a: Intercept</a:t>
             </a:r>
-            <a:endParaRPr lang="en-US" sz="1500" b="0" strike="noStrike" spc="-1">
+            <a:endParaRPr lang="en-US" sz="1500" b="0" strike="noStrike" spc="-1" dirty="0">
               <a:latin typeface="Arial"/>
             </a:endParaRPr>
           </a:p>
@@ -41038,7 +40920,7 @@
               </a:spcBef>
             </a:pPr>
             <a:r>
-              <a:rPr lang="en-US" sz="1500" b="0" strike="noStrike" spc="-1">
+              <a:rPr lang="en-US" sz="1500" b="0" strike="noStrike" spc="-1" dirty="0">
                 <a:solidFill>
                   <a:srgbClr val="000000"/>
                 </a:solidFill>
@@ -41047,7 +40929,7 @@
               </a:rPr>
               <a:t>	b: coefficient of explanatory var., x: explanatory var.</a:t>
             </a:r>
-            <a:endParaRPr lang="en-US" sz="1500" b="0" strike="noStrike" spc="-1">
+            <a:endParaRPr lang="en-US" sz="1500" b="0" strike="noStrike" spc="-1" dirty="0">
               <a:latin typeface="Arial"/>
             </a:endParaRPr>
           </a:p>
@@ -41061,7 +40943,7 @@
               </a:spcBef>
             </a:pPr>
             <a:r>
-              <a:rPr lang="en-US" sz="1500" b="0" strike="noStrike" spc="-1">
+              <a:rPr lang="en-US" sz="1500" b="0" strike="noStrike" spc="-1" dirty="0">
                 <a:solidFill>
                   <a:srgbClr val="000000"/>
                 </a:solidFill>
@@ -41070,7 +40952,7 @@
               </a:rPr>
               <a:t>	err: error term (=residuals)</a:t>
             </a:r>
-            <a:endParaRPr lang="en-US" sz="1500" b="0" strike="noStrike" spc="-1">
+            <a:endParaRPr lang="en-US" sz="1500" b="0" strike="noStrike" spc="-1" dirty="0">
               <a:latin typeface="Arial"/>
             </a:endParaRPr>
           </a:p>
@@ -41084,7 +40966,7 @@
               </a:spcBef>
             </a:pPr>
             <a:r>
-              <a:rPr lang="en-US" sz="2000" b="1" strike="noStrike" spc="-1">
+              <a:rPr lang="en-US" sz="2000" b="1" strike="noStrike" spc="-1" dirty="0">
                 <a:solidFill>
                   <a:srgbClr val="262626"/>
                 </a:solidFill>
@@ -41093,7 +40975,7 @@
               </a:rPr>
               <a:t>Assumptions :</a:t>
             </a:r>
-            <a:endParaRPr lang="en-US" sz="2000" b="0" strike="noStrike" spc="-1">
+            <a:endParaRPr lang="en-US" sz="2000" b="0" strike="noStrike" spc="-1" dirty="0">
               <a:latin typeface="Arial"/>
             </a:endParaRPr>
           </a:p>
@@ -41113,7 +40995,7 @@
               <a:buChar char=""/>
             </a:pPr>
             <a:r>
-              <a:rPr lang="en-US" sz="2000" b="0" strike="noStrike" spc="-1">
+              <a:rPr lang="en-US" sz="2000" b="0" strike="noStrike" spc="-1" dirty="0">
                 <a:solidFill>
                   <a:srgbClr val="4F81BD"/>
                 </a:solidFill>
@@ -41123,7 +41005,7 @@
               <a:t>Homoscedasticity </a:t>
             </a:r>
             <a:r>
-              <a:rPr lang="en-US" sz="1800" b="0" strike="noStrike" spc="-1">
+              <a:rPr lang="en-US" sz="1800" b="0" strike="noStrike" spc="-1" dirty="0">
                 <a:solidFill>
                   <a:srgbClr val="000000"/>
                 </a:solidFill>
@@ -41133,7 +41015,7 @@
               <a:t>: </a:t>
             </a:r>
             <a:r>
-              <a:rPr lang="en-US" sz="1800" b="0" strike="noStrike" spc="-1">
+              <a:rPr lang="en-US" sz="1800" b="0" strike="noStrike" spc="-1" dirty="0">
                 <a:solidFill>
                   <a:srgbClr val="000000"/>
                 </a:solidFill>
@@ -41142,7 +41024,7 @@
               </a:rPr>
               <a:t>independence between residual variance and variables</a:t>
             </a:r>
-            <a:endParaRPr lang="en-US" sz="1800" b="0" strike="noStrike" spc="-1">
+            <a:endParaRPr lang="en-US" sz="1800" b="0" strike="noStrike" spc="-1" dirty="0">
               <a:latin typeface="Arial"/>
             </a:endParaRPr>
           </a:p>
@@ -41162,7 +41044,7 @@
               <a:buChar char=""/>
             </a:pPr>
             <a:r>
-              <a:rPr lang="en-US" sz="2000" b="0" strike="noStrike" spc="-1">
+              <a:rPr lang="en-US" sz="2000" b="0" strike="noStrike" spc="-1" dirty="0">
                 <a:solidFill>
                   <a:srgbClr val="4F81BD"/>
                 </a:solidFill>
@@ -41172,7 +41054,7 @@
               <a:t>Linearity</a:t>
             </a:r>
             <a:r>
-              <a:rPr lang="en-US" sz="2000" b="0" strike="noStrike" spc="-1">
+              <a:rPr lang="en-US" sz="2000" b="0" strike="noStrike" spc="-1" dirty="0">
                 <a:solidFill>
                   <a:srgbClr val="000000"/>
                 </a:solidFill>
@@ -41182,16 +41064,16 @@
               <a:t> + </a:t>
             </a:r>
             <a:r>
-              <a:rPr lang="en-US" sz="2000" b="0" strike="noStrike" spc="-1">
+              <a:rPr lang="en-US" sz="2000" b="0" strike="noStrike" spc="-1" dirty="0">
                 <a:solidFill>
                   <a:srgbClr val="4F81BD"/>
                 </a:solidFill>
                 <a:latin typeface="Calibri"/>
                 <a:ea typeface="DejaVu Sans"/>
               </a:rPr>
-              <a:t>absence of linear relationship between variables</a:t>
-            </a:r>
-            <a:endParaRPr lang="en-US" sz="2000" b="0" strike="noStrike" spc="-1">
+              <a:t>absence of linear relationship between predictor variables</a:t>
+            </a:r>
+            <a:endParaRPr lang="en-US" sz="2000" b="0" strike="noStrike" spc="-1" dirty="0">
               <a:latin typeface="Arial"/>
             </a:endParaRPr>
           </a:p>
@@ -41211,7 +41093,7 @@
               <a:buChar char=""/>
             </a:pPr>
             <a:r>
-              <a:rPr lang="en-US" sz="2000" b="0" strike="noStrike" spc="-1">
+              <a:rPr lang="en-US" sz="2000" b="0" strike="noStrike" spc="-1" dirty="0">
                 <a:solidFill>
                   <a:srgbClr val="4F81BD"/>
                 </a:solidFill>
@@ -41221,7 +41103,7 @@
               <a:t>independence </a:t>
             </a:r>
             <a:r>
-              <a:rPr lang="en-US" sz="2000" b="0" strike="noStrike" spc="-1">
+              <a:rPr lang="en-US" sz="2000" b="0" strike="noStrike" spc="-1" dirty="0">
                 <a:solidFill>
                   <a:srgbClr val="000000"/>
                 </a:solidFill>
@@ -41230,7 +41112,7 @@
               </a:rPr>
               <a:t>of  the observations. </a:t>
             </a:r>
-            <a:endParaRPr lang="en-US" sz="2000" b="0" strike="noStrike" spc="-1">
+            <a:endParaRPr lang="en-US" sz="2000" b="0" strike="noStrike" spc="-1" dirty="0">
               <a:latin typeface="Arial"/>
             </a:endParaRPr>
           </a:p>
@@ -41250,7 +41132,7 @@
               <a:buChar char=""/>
             </a:pPr>
             <a:r>
-              <a:rPr lang="en-US" sz="2000" b="0" strike="noStrike" spc="-1">
+              <a:rPr lang="en-US" sz="2000" b="0" strike="noStrike" spc="-1" dirty="0">
                 <a:solidFill>
                   <a:srgbClr val="000000"/>
                 </a:solidFill>
@@ -41259,7 +41141,7 @@
               </a:rPr>
               <a:t>Residuals centered around predicted value (mean=0)</a:t>
             </a:r>
-            <a:endParaRPr lang="en-US" sz="2000" b="0" strike="noStrike" spc="-1">
+            <a:endParaRPr lang="en-US" sz="2000" b="0" strike="noStrike" spc="-1" dirty="0">
               <a:latin typeface="Arial"/>
             </a:endParaRPr>
           </a:p>
@@ -41279,7 +41161,7 @@
               <a:buChar char=""/>
             </a:pPr>
             <a:r>
-              <a:rPr lang="en-US" sz="2000" b="0" strike="noStrike" spc="-1">
+              <a:rPr lang="en-US" sz="2000" b="0" strike="noStrike" spc="-1" dirty="0">
                 <a:solidFill>
                   <a:srgbClr val="4F81BD"/>
                 </a:solidFill>
@@ -41289,7 +41171,7 @@
               <a:t>+ normality</a:t>
             </a:r>
             <a:r>
-              <a:rPr lang="en-US" sz="2000" b="0" strike="noStrike" spc="-1">
+              <a:rPr lang="en-US" sz="2000" b="0" strike="noStrike" spc="-1" dirty="0">
                 <a:solidFill>
                   <a:srgbClr val="000000"/>
                 </a:solidFill>
@@ -41299,7 +41181,7 @@
               <a:t> of the </a:t>
             </a:r>
             <a:r>
-              <a:rPr lang="en-US" sz="2000" b="1" strike="noStrike" spc="-1">
+              <a:rPr lang="en-US" sz="2000" b="1" strike="noStrike" spc="-1" dirty="0">
                 <a:solidFill>
                   <a:srgbClr val="000000"/>
                 </a:solidFill>
@@ -41308,7 +41190,7 @@
               </a:rPr>
               <a:t>residual’s mean </a:t>
             </a:r>
-            <a:endParaRPr lang="en-US" sz="2000" b="0" strike="noStrike" spc="-1">
+            <a:endParaRPr lang="en-US" sz="2000" b="0" strike="noStrike" spc="-1" dirty="0">
               <a:latin typeface="Arial"/>
             </a:endParaRPr>
           </a:p>
@@ -41328,7 +41210,7 @@
               <a:buChar char=""/>
             </a:pPr>
             <a:r>
-              <a:rPr lang="en-US" sz="2000" b="1" strike="noStrike" spc="-1">
+              <a:rPr lang="en-US" sz="2000" b="1" strike="noStrike" spc="-1" dirty="0">
                 <a:solidFill>
                   <a:srgbClr val="000000"/>
                 </a:solidFill>
@@ -41338,7 +41220,7 @@
               <a:t>→</a:t>
             </a:r>
             <a:r>
-              <a:rPr lang="en-US" sz="2000" b="0" strike="noStrike" spc="-1">
+              <a:rPr lang="en-US" sz="2000" b="0" strike="noStrike" spc="-1" dirty="0">
                 <a:solidFill>
                   <a:srgbClr val="000000"/>
                 </a:solidFill>
@@ -41347,7 +41229,7 @@
               </a:rPr>
               <a:t> only used to assess parameters confidence interval</a:t>
             </a:r>
-            <a:endParaRPr lang="en-US" sz="2000" b="0" strike="noStrike" spc="-1">
+            <a:endParaRPr lang="en-US" sz="2000" b="0" strike="noStrike" spc="-1" dirty="0">
               <a:latin typeface="Arial"/>
             </a:endParaRPr>
           </a:p>
@@ -41366,7 +41248,7 @@
               <a:buChar char="•"/>
             </a:pPr>
             <a:r>
-              <a:rPr lang="en-US" sz="1800" b="0" i="1" strike="noStrike" spc="-1">
+              <a:rPr lang="en-US" sz="1800" b="0" i="1" strike="noStrike" spc="-1" dirty="0">
                 <a:solidFill>
                   <a:srgbClr val="000000"/>
                 </a:solidFill>
@@ -41375,7 +41257,7 @@
               </a:rPr>
               <a:t>Otherwise : try log-transform (for heteroskedasticity) or non-parametric methods if the assumptions are not met.</a:t>
             </a:r>
-            <a:endParaRPr lang="en-US" sz="1800" b="0" strike="noStrike" spc="-1">
+            <a:endParaRPr lang="en-US" sz="1800" b="0" strike="noStrike" spc="-1" dirty="0">
               <a:latin typeface="Arial"/>
             </a:endParaRPr>
           </a:p>
@@ -41388,7 +41270,7 @@
                 <a:spcPts val="1001"/>
               </a:spcBef>
             </a:pPr>
-            <a:endParaRPr lang="en-US" sz="1800" b="0" strike="noStrike" spc="-1">
+            <a:endParaRPr lang="en-US" sz="1800" b="0" strike="noStrike" spc="-1" dirty="0">
               <a:latin typeface="Arial"/>
             </a:endParaRPr>
           </a:p>
@@ -48752,16 +48634,36 @@
               </a:spcBef>
             </a:pPr>
             <a:r>
-              <a:rPr lang="en-US" sz="2400" b="0" strike="noStrike" spc="-1">
+              <a:rPr lang="en-US" sz="2400" b="0" strike="noStrike" spc="-1" dirty="0">
                 <a:solidFill>
                   <a:srgbClr val="4F81BD"/>
                 </a:solidFill>
                 <a:latin typeface="Courier New"/>
                 <a:ea typeface="Courier New"/>
               </a:rPr>
-              <a:t>&gt;summary(model_height_age)</a:t>
-            </a:r>
-            <a:endParaRPr lang="en-US" sz="2400" b="0" strike="noStrike" spc="-1">
+              <a:t>&gt;summary(</a:t>
+            </a:r>
+            <a:r>
+              <a:rPr lang="en-US" sz="2400" b="0" strike="noStrike" spc="-1" dirty="0" err="1">
+                <a:solidFill>
+                  <a:srgbClr val="4F81BD"/>
+                </a:solidFill>
+                <a:latin typeface="Courier New"/>
+                <a:ea typeface="Courier New"/>
+              </a:rPr>
+              <a:t>model_height_age</a:t>
+            </a:r>
+            <a:r>
+              <a:rPr lang="en-US" sz="2400" b="0" strike="noStrike" spc="-1" dirty="0">
+                <a:solidFill>
+                  <a:srgbClr val="4F81BD"/>
+                </a:solidFill>
+                <a:latin typeface="Courier New"/>
+                <a:ea typeface="Courier New"/>
+              </a:rPr>
+              <a:t>)</a:t>
+            </a:r>
+            <a:endParaRPr lang="en-US" sz="2400" b="0" strike="noStrike" spc="-1" dirty="0">
               <a:latin typeface="Arial"/>
             </a:endParaRPr>
           </a:p>
@@ -48775,7 +48677,7 @@
               </a:spcBef>
             </a:pPr>
             <a:r>
-              <a:rPr lang="en-US" sz="1800" b="0" strike="noStrike" spc="-1">
+              <a:rPr lang="en-US" sz="1800" b="0" strike="noStrike" spc="-1" dirty="0">
                 <a:solidFill>
                   <a:srgbClr val="262626"/>
                 </a:solidFill>
@@ -48784,7 +48686,7 @@
               </a:rPr>
               <a:t>Call:</a:t>
             </a:r>
-            <a:endParaRPr lang="en-US" sz="1800" b="0" strike="noStrike" spc="-1">
+            <a:endParaRPr lang="en-US" sz="1800" b="0" strike="noStrike" spc="-1" dirty="0">
               <a:latin typeface="Arial"/>
             </a:endParaRPr>
           </a:p>
@@ -48798,16 +48700,46 @@
               </a:spcBef>
             </a:pPr>
             <a:r>
-              <a:rPr lang="en-US" sz="1800" b="0" strike="noStrike" spc="-1">
+              <a:rPr lang="en-US" sz="1800" b="0" strike="noStrike" spc="-1" dirty="0" err="1">
                 <a:solidFill>
                   <a:srgbClr val="262626"/>
                 </a:solidFill>
                 <a:latin typeface="Courier New"/>
                 <a:ea typeface="Courier New"/>
               </a:rPr>
-              <a:t>lm(formula = Height ~ Age, data = class_data)</a:t>
-            </a:r>
-            <a:endParaRPr lang="en-US" sz="1800" b="0" strike="noStrike" spc="-1">
+              <a:t>lm</a:t>
+            </a:r>
+            <a:r>
+              <a:rPr lang="en-US" sz="1800" b="0" strike="noStrike" spc="-1" dirty="0">
+                <a:solidFill>
+                  <a:srgbClr val="262626"/>
+                </a:solidFill>
+                <a:latin typeface="Courier New"/>
+                <a:ea typeface="Courier New"/>
+              </a:rPr>
+              <a:t>(formula = Height ~ Age, data = </a:t>
+            </a:r>
+            <a:r>
+              <a:rPr lang="en-US" sz="1800" b="0" strike="noStrike" spc="-1" dirty="0" err="1">
+                <a:solidFill>
+                  <a:srgbClr val="262626"/>
+                </a:solidFill>
+                <a:latin typeface="Courier New"/>
+                <a:ea typeface="Courier New"/>
+              </a:rPr>
+              <a:t>class_data</a:t>
+            </a:r>
+            <a:r>
+              <a:rPr lang="en-US" sz="1800" b="0" strike="noStrike" spc="-1" dirty="0">
+                <a:solidFill>
+                  <a:srgbClr val="262626"/>
+                </a:solidFill>
+                <a:latin typeface="Courier New"/>
+                <a:ea typeface="Courier New"/>
+              </a:rPr>
+              <a:t>)</a:t>
+            </a:r>
+            <a:endParaRPr lang="en-US" sz="1800" b="0" strike="noStrike" spc="-1" dirty="0">
               <a:latin typeface="Arial"/>
             </a:endParaRPr>
           </a:p>
@@ -48820,7 +48752,7 @@
                 <a:spcPts val="360"/>
               </a:spcBef>
             </a:pPr>
-            <a:endParaRPr lang="en-US" sz="1800" b="0" strike="noStrike" spc="-1">
+            <a:endParaRPr lang="en-US" sz="1800" b="0" strike="noStrike" spc="-1" dirty="0">
               <a:latin typeface="Arial"/>
             </a:endParaRPr>
           </a:p>
@@ -48834,7 +48766,7 @@
               </a:spcBef>
             </a:pPr>
             <a:r>
-              <a:rPr lang="en-US" sz="1800" b="0" strike="noStrike" spc="-1">
+              <a:rPr lang="en-US" sz="1800" b="0" strike="noStrike" spc="-1" dirty="0">
                 <a:solidFill>
                   <a:srgbClr val="262626"/>
                 </a:solidFill>
@@ -48843,7 +48775,7 @@
               </a:rPr>
               <a:t>Residuals:</a:t>
             </a:r>
-            <a:endParaRPr lang="en-US" sz="1800" b="0" strike="noStrike" spc="-1">
+            <a:endParaRPr lang="en-US" sz="1800" b="0" strike="noStrike" spc="-1" dirty="0">
               <a:latin typeface="Arial"/>
             </a:endParaRPr>
           </a:p>
@@ -48857,7 +48789,7 @@
               </a:spcBef>
             </a:pPr>
             <a:r>
-              <a:rPr lang="en-US" sz="1800" b="0" strike="noStrike" spc="-1">
+              <a:rPr lang="en-US" sz="1800" b="0" strike="noStrike" spc="-1" dirty="0">
                 <a:solidFill>
                   <a:srgbClr val="262626"/>
                 </a:solidFill>
@@ -48866,7 +48798,7 @@
               </a:rPr>
               <a:t>     Min       1Q   Median       3Q      Max </a:t>
             </a:r>
-            <a:endParaRPr lang="en-US" sz="1800" b="0" strike="noStrike" spc="-1">
+            <a:endParaRPr lang="en-US" sz="1800" b="0" strike="noStrike" spc="-1" dirty="0">
               <a:latin typeface="Arial"/>
             </a:endParaRPr>
           </a:p>
@@ -48880,7 +48812,7 @@
               </a:spcBef>
             </a:pPr>
             <a:r>
-              <a:rPr lang="en-US" sz="1800" b="0" strike="noStrike" spc="-1">
+              <a:rPr lang="en-US" sz="1800" b="0" strike="noStrike" spc="-1" dirty="0">
                 <a:solidFill>
                   <a:srgbClr val="262626"/>
                 </a:solidFill>
@@ -48889,7 +48821,7 @@
               </a:rPr>
               <a:t>-12.5900  -3.5730  -0.0787   3.4900  15.5713 </a:t>
             </a:r>
-            <a:endParaRPr lang="en-US" sz="1800" b="0" strike="noStrike" spc="-1">
+            <a:endParaRPr lang="en-US" sz="1800" b="0" strike="noStrike" spc="-1" dirty="0">
               <a:latin typeface="Arial"/>
             </a:endParaRPr>
           </a:p>
@@ -48902,7 +48834,7 @@
                 <a:spcPts val="360"/>
               </a:spcBef>
             </a:pPr>
-            <a:endParaRPr lang="en-US" sz="1800" b="0" strike="noStrike" spc="-1">
+            <a:endParaRPr lang="en-US" sz="1800" b="0" strike="noStrike" spc="-1" dirty="0">
               <a:latin typeface="Arial"/>
             </a:endParaRPr>
           </a:p>
@@ -48916,7 +48848,7 @@
               </a:spcBef>
             </a:pPr>
             <a:r>
-              <a:rPr lang="en-US" sz="1800" b="0" strike="noStrike" spc="-1">
+              <a:rPr lang="en-US" sz="1800" b="0" strike="noStrike" spc="-1" dirty="0">
                 <a:solidFill>
                   <a:srgbClr val="262626"/>
                 </a:solidFill>
@@ -48925,7 +48857,7 @@
               </a:rPr>
               <a:t>Coefficients:</a:t>
             </a:r>
-            <a:endParaRPr lang="en-US" sz="1800" b="0" strike="noStrike" spc="-1">
+            <a:endParaRPr lang="en-US" sz="1800" b="0" strike="noStrike" spc="-1" dirty="0">
               <a:latin typeface="Arial"/>
             </a:endParaRPr>
           </a:p>
@@ -48939,16 +48871,36 @@
               </a:spcBef>
             </a:pPr>
             <a:r>
-              <a:rPr lang="en-US" sz="1800" b="0" strike="noStrike" spc="-1">
+              <a:rPr lang="en-US" sz="1800" b="0" strike="noStrike" spc="-1" dirty="0">
                 <a:solidFill>
                   <a:srgbClr val="262626"/>
                 </a:solidFill>
                 <a:latin typeface="Courier New"/>
                 <a:ea typeface="Courier New"/>
               </a:rPr>
-              <a:t>            Estimate Std. Error t value Pr(&gt;|t|)    </a:t>
-            </a:r>
-            <a:endParaRPr lang="en-US" sz="1800" b="0" strike="noStrike" spc="-1">
+              <a:t>            Estimate Std. Error t value </a:t>
+            </a:r>
+            <a:r>
+              <a:rPr lang="en-US" sz="1800" b="0" strike="noStrike" spc="-1" dirty="0" err="1">
+                <a:solidFill>
+                  <a:srgbClr val="262626"/>
+                </a:solidFill>
+                <a:latin typeface="Courier New"/>
+                <a:ea typeface="Courier New"/>
+              </a:rPr>
+              <a:t>Pr</a:t>
+            </a:r>
+            <a:r>
+              <a:rPr lang="en-US" sz="1800" b="0" strike="noStrike" spc="-1" dirty="0">
+                <a:solidFill>
+                  <a:srgbClr val="262626"/>
+                </a:solidFill>
+                <a:latin typeface="Courier New"/>
+                <a:ea typeface="Courier New"/>
+              </a:rPr>
+              <a:t>(&gt;|t|)    </a:t>
+            </a:r>
+            <a:endParaRPr lang="en-US" sz="1800" b="0" strike="noStrike" spc="-1" dirty="0">
               <a:latin typeface="Arial"/>
             </a:endParaRPr>
           </a:p>
@@ -48962,7 +48914,7 @@
               </a:spcBef>
             </a:pPr>
             <a:r>
-              <a:rPr lang="en-US" sz="1800" b="0" strike="noStrike" spc="-1">
+              <a:rPr lang="en-US" sz="1800" b="0" strike="noStrike" spc="-1" dirty="0">
                 <a:solidFill>
                   <a:srgbClr val="262626"/>
                 </a:solidFill>
@@ -48971,7 +48923,7 @@
               </a:rPr>
               <a:t>(Intercept)   64.069     16.565   3.868  0.00124 ** </a:t>
             </a:r>
-            <a:endParaRPr lang="en-US" sz="1800" b="0" strike="noStrike" spc="-1">
+            <a:endParaRPr lang="en-US" sz="1800" b="0" strike="noStrike" spc="-1" dirty="0">
               <a:latin typeface="Arial"/>
             </a:endParaRPr>
           </a:p>
@@ -48985,7 +48937,7 @@
               </a:spcBef>
             </a:pPr>
             <a:r>
-              <a:rPr lang="en-US" sz="1800" b="0" strike="noStrike" spc="-1">
+              <a:rPr lang="en-US" sz="1800" b="0" strike="noStrike" spc="-1" dirty="0">
                 <a:solidFill>
                   <a:srgbClr val="262626"/>
                 </a:solidFill>
@@ -48995,7 +48947,7 @@
               <a:t>Age            7.079      1.237   5.724 </a:t>
             </a:r>
             <a:r>
-              <a:rPr lang="en-US" sz="1800" b="0" strike="noStrike" spc="-1">
+              <a:rPr lang="en-US" sz="1800" b="0" strike="noStrike" spc="-1" dirty="0">
                 <a:solidFill>
                   <a:srgbClr val="4F81BD"/>
                 </a:solidFill>
@@ -49005,7 +48957,7 @@
               <a:t>2.48e-05 </a:t>
             </a:r>
             <a:r>
-              <a:rPr lang="en-US" sz="1800" b="0" strike="noStrike" spc="-1">
+              <a:rPr lang="en-US" sz="1800" b="0" strike="noStrike" spc="-1" dirty="0">
                 <a:solidFill>
                   <a:srgbClr val="262626"/>
                 </a:solidFill>
@@ -49014,7 +48966,7 @@
               </a:rPr>
               <a:t>***</a:t>
             </a:r>
-            <a:endParaRPr lang="en-US" sz="1800" b="0" strike="noStrike" spc="-1">
+            <a:endParaRPr lang="en-US" sz="1800" b="0" strike="noStrike" spc="-1" dirty="0">
               <a:latin typeface="Arial"/>
             </a:endParaRPr>
           </a:p>
@@ -49028,7 +48980,7 @@
               </a:spcBef>
             </a:pPr>
             <a:r>
-              <a:rPr lang="en-US" sz="1800" b="0" strike="noStrike" spc="-1">
+              <a:rPr lang="en-US" sz="1800" b="0" strike="noStrike" spc="-1" dirty="0">
                 <a:solidFill>
                   <a:srgbClr val="262626"/>
                 </a:solidFill>
@@ -49037,7 +48989,7 @@
               </a:rPr>
               <a:t>---</a:t>
             </a:r>
-            <a:endParaRPr lang="en-US" sz="1800" b="0" strike="noStrike" spc="-1">
+            <a:endParaRPr lang="en-US" sz="1800" b="0" strike="noStrike" spc="-1" dirty="0">
               <a:latin typeface="Arial"/>
             </a:endParaRPr>
           </a:p>
@@ -49051,16 +49003,26 @@
               </a:spcBef>
             </a:pPr>
             <a:r>
-              <a:rPr lang="en-US" sz="1800" b="0" strike="noStrike" spc="-1">
+              <a:rPr lang="en-US" sz="1800" b="0" strike="noStrike" spc="-1" dirty="0" err="1">
                 <a:solidFill>
                   <a:srgbClr val="262626"/>
                 </a:solidFill>
                 <a:latin typeface="Courier New"/>
                 <a:ea typeface="Courier New"/>
               </a:rPr>
-              <a:t>Signif. codes:  0 ‘***’ 0.001 ‘**’ 0.01 ‘*’ 0.05 ‘.’ 0.1 ‘ ’ 1</a:t>
-            </a:r>
-            <a:endParaRPr lang="en-US" sz="1800" b="0" strike="noStrike" spc="-1">
+              <a:t>Signif</a:t>
+            </a:r>
+            <a:r>
+              <a:rPr lang="en-US" sz="1800" b="0" strike="noStrike" spc="-1" dirty="0">
+                <a:solidFill>
+                  <a:srgbClr val="262626"/>
+                </a:solidFill>
+                <a:latin typeface="Courier New"/>
+                <a:ea typeface="Courier New"/>
+              </a:rPr>
+              <a:t>. codes:  0 ‘***’ 0.001 ‘**’ 0.01 ‘*’ 0.05 ‘.’ 0.1 ‘ ’ 1</a:t>
+            </a:r>
+            <a:endParaRPr lang="en-US" sz="1800" b="0" strike="noStrike" spc="-1" dirty="0">
               <a:latin typeface="Arial"/>
             </a:endParaRPr>
           </a:p>
@@ -49073,7 +49035,7 @@
                 <a:spcPts val="360"/>
               </a:spcBef>
             </a:pPr>
-            <a:endParaRPr lang="en-US" sz="1800" b="0" strike="noStrike" spc="-1">
+            <a:endParaRPr lang="en-US" sz="1800" b="0" strike="noStrike" spc="-1" dirty="0">
               <a:latin typeface="Arial"/>
             </a:endParaRPr>
           </a:p>
@@ -49087,7 +49049,7 @@
               </a:spcBef>
             </a:pPr>
             <a:r>
-              <a:rPr lang="en-US" sz="1800" b="0" strike="noStrike" spc="-1">
+              <a:rPr lang="en-US" sz="1800" b="0" strike="noStrike" spc="-1" dirty="0">
                 <a:solidFill>
                   <a:srgbClr val="262626"/>
                 </a:solidFill>
@@ -49096,7 +49058,7 @@
               </a:rPr>
               <a:t>Residual standard error: 7.832 on 17 degrees of freedom</a:t>
             </a:r>
-            <a:endParaRPr lang="en-US" sz="1800" b="0" strike="noStrike" spc="-1">
+            <a:endParaRPr lang="en-US" sz="1800" b="0" strike="noStrike" spc="-1" dirty="0">
               <a:latin typeface="Arial"/>
             </a:endParaRPr>
           </a:p>
@@ -49110,7 +49072,7 @@
               </a:spcBef>
             </a:pPr>
             <a:r>
-              <a:rPr lang="en-US" sz="1800" b="0" strike="noStrike" spc="-1">
+              <a:rPr lang="en-US" sz="1800" b="0" strike="noStrike" spc="-1" dirty="0">
                 <a:solidFill>
                   <a:srgbClr val="262626"/>
                 </a:solidFill>
@@ -49119,7 +49081,7 @@
               </a:rPr>
               <a:t>Multiple R-squared:  0.6584,	Adjusted R-squared:  0.6383 </a:t>
             </a:r>
-            <a:endParaRPr lang="en-US" sz="1800" b="0" strike="noStrike" spc="-1">
+            <a:endParaRPr lang="en-US" sz="1800" b="0" strike="noStrike" spc="-1" dirty="0">
               <a:latin typeface="Arial"/>
             </a:endParaRPr>
           </a:p>
@@ -49133,7 +49095,7 @@
               </a:spcBef>
             </a:pPr>
             <a:r>
-              <a:rPr lang="en-US" sz="1800" b="0" strike="noStrike" spc="-1">
+              <a:rPr lang="en-US" sz="1800" b="0" strike="noStrike" spc="-1" dirty="0">
                 <a:solidFill>
                   <a:srgbClr val="262626"/>
                 </a:solidFill>
@@ -49143,7 +49105,7 @@
               <a:t>F-statistic: 32.77 on 1 and 17 DF,  p-value: </a:t>
             </a:r>
             <a:r>
-              <a:rPr lang="en-US" sz="1800" b="0" strike="noStrike" spc="-1">
+              <a:rPr lang="en-US" sz="1800" b="0" strike="noStrike" spc="-1" dirty="0">
                 <a:solidFill>
                   <a:srgbClr val="4F81BD"/>
                 </a:solidFill>
@@ -49152,7 +49114,7 @@
               </a:rPr>
               <a:t>2.48e-05</a:t>
             </a:r>
-            <a:endParaRPr lang="en-US" sz="1800" b="0" strike="noStrike" spc="-1">
+            <a:endParaRPr lang="en-US" sz="1800" b="0" strike="noStrike" spc="-1" dirty="0">
               <a:latin typeface="Arial"/>
             </a:endParaRPr>
           </a:p>
@@ -49165,7 +49127,7 @@
                 <a:spcPts val="479"/>
               </a:spcBef>
             </a:pPr>
-            <a:endParaRPr lang="en-US" sz="1800" b="0" strike="noStrike" spc="-1">
+            <a:endParaRPr lang="en-US" sz="1800" b="0" strike="noStrike" spc="-1" dirty="0">
               <a:latin typeface="Arial"/>
             </a:endParaRPr>
           </a:p>
@@ -49178,7 +49140,7 @@
                 <a:spcPts val="479"/>
               </a:spcBef>
             </a:pPr>
-            <a:endParaRPr lang="en-US" sz="1800" b="0" strike="noStrike" spc="-1">
+            <a:endParaRPr lang="en-US" sz="1800" b="0" strike="noStrike" spc="-1" dirty="0">
               <a:latin typeface="Arial"/>
             </a:endParaRPr>
           </a:p>
@@ -49484,7 +49446,7 @@
         </p:nvSpPr>
         <p:spPr>
           <a:xfrm>
-            <a:off x="4400640" y="5959800"/>
+            <a:off x="4400460" y="6098732"/>
             <a:ext cx="4000680" cy="910800"/>
           </a:xfrm>
           <a:prstGeom prst="rect">
@@ -49517,7 +49479,7 @@
               </a:lnSpc>
             </a:pPr>
             <a:r>
-              <a:rPr lang="en-US" sz="1800" b="0" strike="noStrike" spc="-1">
+              <a:rPr lang="en-US" sz="1800" b="0" strike="noStrike" spc="-1" dirty="0">
                 <a:solidFill>
                   <a:srgbClr val="4F81BD"/>
                 </a:solidFill>
@@ -49527,16 +49489,16 @@
               <a:t>F-test: </a:t>
             </a:r>
             <a:r>
-              <a:rPr lang="en-US" sz="1800" b="0" strike="noStrike" spc="-1">
+              <a:rPr lang="en-US" sz="1800" b="0" strike="noStrike" spc="-1" dirty="0">
                 <a:solidFill>
                   <a:srgbClr val="000000"/>
                 </a:solidFill>
                 <a:latin typeface="Calibri"/>
                 <a:ea typeface="DejaVu Sans"/>
               </a:rPr>
-              <a:t>Is the model significant compared to a model with just the intercept? YES</a:t>
-            </a:r>
-            <a:endParaRPr lang="en-US" sz="1800" b="0" strike="noStrike" spc="-1">
+              <a:t>Is the result significant compared to a model with just the intercept? YES</a:t>
+            </a:r>
+            <a:endParaRPr lang="en-US" sz="1800" b="0" strike="noStrike" spc="-1" dirty="0">
               <a:latin typeface="Arial"/>
             </a:endParaRPr>
           </a:p>
@@ -51139,8 +51101,8 @@
         </p:nvSpPr>
         <p:spPr>
           <a:xfrm>
-            <a:off x="258480" y="-90720"/>
-            <a:ext cx="8756280" cy="1216800"/>
+            <a:off x="258480" y="0"/>
+            <a:ext cx="8756280" cy="788623"/>
           </a:xfrm>
           <a:prstGeom prst="rect">
             <a:avLst/>
@@ -51172,7 +51134,7 @@
               </a:lnSpc>
             </a:pPr>
             <a:r>
-              <a:rPr lang="en-US" sz="4000" b="0" strike="noStrike" spc="-1">
+              <a:rPr lang="en-US" sz="4000" b="0" strike="noStrike" spc="-1" dirty="0">
                 <a:solidFill>
                   <a:srgbClr val="4F81BD"/>
                 </a:solidFill>
@@ -51181,7 +51143,7 @@
               </a:rPr>
               <a:t>Summary - Overall analysis workflow  </a:t>
             </a:r>
-            <a:endParaRPr lang="en-US" sz="4000" b="0" strike="noStrike" spc="-1">
+            <a:endParaRPr lang="en-US" sz="4000" b="0" strike="noStrike" spc="-1" dirty="0">
               <a:latin typeface="Arial"/>
             </a:endParaRPr>
           </a:p>
@@ -52465,7 +52427,7 @@
         </p:nvSpPr>
         <p:spPr>
           <a:xfrm>
-            <a:off x="274320" y="905040"/>
+            <a:off x="274320" y="926812"/>
             <a:ext cx="8513280" cy="4851000"/>
           </a:xfrm>
           <a:prstGeom prst="rect">
@@ -52501,16 +52463,36 @@
               </a:spcBef>
             </a:pPr>
             <a:r>
-              <a:rPr lang="en-US" sz="2000" b="0" strike="noStrike" spc="-1">
+              <a:rPr lang="en-US" sz="2000" b="0" strike="noStrike" spc="-1" dirty="0">
                 <a:solidFill>
                   <a:srgbClr val="000000"/>
                 </a:solidFill>
                 <a:latin typeface="Calibri"/>
                 <a:ea typeface="DejaVu Sans"/>
               </a:rPr>
-              <a:t>The data set "Pima" comes from a study on diabetes in women of Pima Indian heritage. We are using a subset (Pima.tr).</a:t>
-            </a:r>
-            <a:endParaRPr lang="en-US" sz="2000" b="0" strike="noStrike" spc="-1">
+              <a:t>The data set "Pima" comes from a study on diabetes in women of Pima Indian heritage. We are using a subset (</a:t>
+            </a:r>
+            <a:r>
+              <a:rPr lang="en-US" sz="2000" b="0" strike="noStrike" spc="-1" dirty="0" err="1">
+                <a:solidFill>
+                  <a:srgbClr val="000000"/>
+                </a:solidFill>
+                <a:latin typeface="Calibri"/>
+                <a:ea typeface="DejaVu Sans"/>
+              </a:rPr>
+              <a:t>Pima.tr</a:t>
+            </a:r>
+            <a:r>
+              <a:rPr lang="en-US" sz="2000" b="0" strike="noStrike" spc="-1" dirty="0">
+                <a:solidFill>
+                  <a:srgbClr val="000000"/>
+                </a:solidFill>
+                <a:latin typeface="Calibri"/>
+                <a:ea typeface="DejaVu Sans"/>
+              </a:rPr>
+              <a:t>).</a:t>
+            </a:r>
+            <a:endParaRPr lang="en-US" sz="2000" b="0" strike="noStrike" spc="-1" dirty="0">
               <a:latin typeface="Arial"/>
             </a:endParaRPr>
           </a:p>
@@ -52524,16 +52506,36 @@
               </a:spcBef>
             </a:pPr>
             <a:r>
-              <a:rPr lang="en-US" sz="2000" b="0" strike="noStrike" spc="-1">
+              <a:rPr lang="en-US" sz="2000" b="0" strike="noStrike" spc="-1" dirty="0">
                 <a:solidFill>
                   <a:srgbClr val="000000"/>
                 </a:solidFill>
                 <a:latin typeface="Calibri"/>
                 <a:ea typeface="DejaVu Sans"/>
               </a:rPr>
-              <a:t>1) Load the package MASS using library(). (You may need to install it first). Load the dataset Pima.tr using data(). Use ? to get an idea which variables it contains.</a:t>
-            </a:r>
-            <a:endParaRPr lang="en-US" sz="2000" b="0" strike="noStrike" spc="-1">
+              <a:t>1) Load the package MASS using library(). (You may need to install it first). Load the dataset </a:t>
+            </a:r>
+            <a:r>
+              <a:rPr lang="en-US" sz="2000" b="0" strike="noStrike" spc="-1" dirty="0" err="1">
+                <a:solidFill>
+                  <a:srgbClr val="000000"/>
+                </a:solidFill>
+                <a:latin typeface="Calibri"/>
+                <a:ea typeface="DejaVu Sans"/>
+              </a:rPr>
+              <a:t>Pima.tr</a:t>
+            </a:r>
+            <a:r>
+              <a:rPr lang="en-US" sz="2000" b="0" strike="noStrike" spc="-1" dirty="0">
+                <a:solidFill>
+                  <a:srgbClr val="000000"/>
+                </a:solidFill>
+                <a:latin typeface="Calibri"/>
+                <a:ea typeface="DejaVu Sans"/>
+              </a:rPr>
+              <a:t> using data(). Use ? to get an idea which variables it contains.</a:t>
+            </a:r>
+            <a:endParaRPr lang="en-US" sz="2000" b="0" strike="noStrike" spc="-1" dirty="0">
               <a:latin typeface="Arial"/>
             </a:endParaRPr>
           </a:p>
@@ -52547,16 +52549,36 @@
               </a:spcBef>
             </a:pPr>
             <a:r>
-              <a:rPr lang="en-US" sz="2000" b="0" strike="noStrike" spc="-1">
+              <a:rPr lang="en-US" sz="2000" b="0" strike="noStrike" spc="-1" dirty="0">
                 <a:solidFill>
                   <a:srgbClr val="000000"/>
                 </a:solidFill>
                 <a:latin typeface="Calibri"/>
                 <a:ea typeface="DejaVu Sans"/>
               </a:rPr>
-              <a:t>2) Hypothesis: Blood glucose level (glu) is associated with diastolic blood pressure (bp). Run a linear model to test the hypothesis.</a:t>
-            </a:r>
-            <a:endParaRPr lang="en-US" sz="2000" b="0" strike="noStrike" spc="-1">
+              <a:t>2) Hypothesis: Blood glucose level (</a:t>
+            </a:r>
+            <a:r>
+              <a:rPr lang="en-US" sz="2000" b="0" strike="noStrike" spc="-1" dirty="0" err="1">
+                <a:solidFill>
+                  <a:srgbClr val="000000"/>
+                </a:solidFill>
+                <a:latin typeface="Calibri"/>
+                <a:ea typeface="DejaVu Sans"/>
+              </a:rPr>
+              <a:t>glu</a:t>
+            </a:r>
+            <a:r>
+              <a:rPr lang="en-US" sz="2000" b="0" strike="noStrike" spc="-1" dirty="0">
+                <a:solidFill>
+                  <a:srgbClr val="000000"/>
+                </a:solidFill>
+                <a:latin typeface="Calibri"/>
+                <a:ea typeface="DejaVu Sans"/>
+              </a:rPr>
+              <a:t>) is associated with diastolic blood pressure (bp). Run a linear model to test the hypothesis.</a:t>
+            </a:r>
+            <a:endParaRPr lang="en-US" sz="2000" b="0" strike="noStrike" spc="-1" dirty="0">
               <a:latin typeface="Arial"/>
             </a:endParaRPr>
           </a:p>
@@ -52570,7 +52592,7 @@
               </a:spcBef>
             </a:pPr>
             <a:r>
-              <a:rPr lang="en-US" sz="2000" b="0" strike="noStrike" spc="-1">
+              <a:rPr lang="en-US" sz="2000" b="0" strike="noStrike" spc="-1" dirty="0">
                 <a:solidFill>
                   <a:srgbClr val="000000"/>
                 </a:solidFill>
@@ -52579,7 +52601,7 @@
               </a:rPr>
               <a:t>3) Visualize the fit with a scatter plot and a trend line.</a:t>
             </a:r>
-            <a:endParaRPr lang="en-US" sz="2000" b="0" strike="noStrike" spc="-1">
+            <a:endParaRPr lang="en-US" sz="2000" b="0" strike="noStrike" spc="-1" dirty="0">
               <a:latin typeface="Arial"/>
             </a:endParaRPr>
           </a:p>
@@ -52593,7 +52615,7 @@
               </a:spcBef>
             </a:pPr>
             <a:r>
-              <a:rPr lang="en-US" sz="2000" b="0" strike="noStrike" spc="-1">
+              <a:rPr lang="en-US" sz="2000" b="0" strike="noStrike" spc="-1" dirty="0">
                 <a:solidFill>
                   <a:srgbClr val="000000"/>
                 </a:solidFill>
@@ -52602,7 +52624,7 @@
               </a:rPr>
               <a:t>4) Check assumptions of the model (homoscedasticity, mean of residual at 0, normality of the residuals) graphically.</a:t>
             </a:r>
-            <a:endParaRPr lang="en-US" sz="2000" b="0" strike="noStrike" spc="-1">
+            <a:endParaRPr lang="en-US" sz="2000" b="0" strike="noStrike" spc="-1" dirty="0">
               <a:latin typeface="Arial"/>
             </a:endParaRPr>
           </a:p>
@@ -52615,7 +52637,7 @@
                 <a:spcPts val="1001"/>
               </a:spcBef>
             </a:pPr>
-            <a:endParaRPr lang="en-US" sz="2000" b="0" strike="noStrike" spc="-1">
+            <a:endParaRPr lang="en-US" sz="2000" b="0" strike="noStrike" spc="-1" dirty="0">
               <a:latin typeface="Arial"/>
             </a:endParaRPr>
           </a:p>
@@ -52628,7 +52650,7 @@
                 <a:spcPts val="1001"/>
               </a:spcBef>
             </a:pPr>
-            <a:endParaRPr lang="en-US" sz="2000" b="0" strike="noStrike" spc="-1">
+            <a:endParaRPr lang="en-US" sz="2000" b="0" strike="noStrike" spc="-1" dirty="0">
               <a:latin typeface="Arial"/>
             </a:endParaRPr>
           </a:p>
@@ -52641,7 +52663,7 @@
                 <a:spcPts val="1001"/>
               </a:spcBef>
             </a:pPr>
-            <a:endParaRPr lang="en-US" sz="2000" b="0" strike="noStrike" spc="-1">
+            <a:endParaRPr lang="en-US" sz="2000" b="0" strike="noStrike" spc="-1" dirty="0">
               <a:latin typeface="Arial"/>
             </a:endParaRPr>
           </a:p>
@@ -52654,7 +52676,7 @@
                 <a:spcPts val="1001"/>
               </a:spcBef>
             </a:pPr>
-            <a:endParaRPr lang="en-US" sz="2000" b="0" strike="noStrike" spc="-1">
+            <a:endParaRPr lang="en-US" sz="2000" b="0" strike="noStrike" spc="-1" dirty="0">
               <a:latin typeface="Arial"/>
             </a:endParaRPr>
           </a:p>
@@ -54599,7 +54621,7 @@
                 </a:solidFill>
                 <a:latin typeface="Calibri"/>
               </a:rPr>
-              <a:t>The means of the two groups follow a normal distribution</a:t>
+              <a:t>The two groups follow a normal distribution</a:t>
             </a:r>
             <a:endParaRPr lang="en-US" sz="2000" b="0" strike="noStrike" spc="-1" dirty="0">
               <a:latin typeface="Arial"/>

</xml_diff>

<commit_message>
removed names from slides
</commit_message>
<xml_diff>
--- a/assets/pptx/First-steps-with-R_day2_afternoon.pptx
+++ b/assets/pptx/First-steps-with-R_day2_afternoon.pptx
@@ -175,6 +175,14 @@
 </p:presentation>
 </file>
 
+<file path=ppt/revisionInfo.xml><?xml version="1.0" encoding="utf-8"?>
+<p1510:revInfo xmlns:a="http://schemas.openxmlformats.org/drawingml/2006/main" xmlns:r="http://schemas.openxmlformats.org/officeDocument/2006/relationships" xmlns:p1510="http://schemas.microsoft.com/office/powerpoint/2015/10/main">
+  <p1510:revLst>
+    <p1510:client id="{392ED2F1-DFBE-2000-2D8C-A4A850B9DDEA}" v="5" dt="2023-10-17T07:28:23.484"/>
+  </p1510:revLst>
+</p1510:revInfo>
+</file>
+
 <file path=ppt/notesMasters/notesMaster1.xml><?xml version="1.0" encoding="utf-8"?>
 <p:notesMaster xmlns:a="http://schemas.openxmlformats.org/drawingml/2006/main" xmlns:r="http://schemas.openxmlformats.org/officeDocument/2006/relationships" xmlns:p="http://schemas.openxmlformats.org/presentationml/2006/main">
   <p:cSld>
@@ -387,7 +395,7 @@
               <a:rPr lang="en-US" sz="1400" b="0" strike="noStrike" spc="-1">
                 <a:latin typeface="Times New Roman"/>
               </a:rPr>
-              <a:t>‹N°›</a:t>
+              <a:t>‹#›</a:t>
             </a:fld>
             <a:endParaRPr lang="en-US" sz="1400" b="0" strike="noStrike" spc="-1">
               <a:latin typeface="Times New Roman"/>
@@ -23962,7 +23970,7 @@
         </p:spPr>
         <p:txBody>
           <a:bodyPr vert="horz" lIns="0" tIns="0" rIns="0" bIns="0" rtlCol="0" anchor="t">
-            <a:normAutofit fontScale="70000" lnSpcReduction="20000"/>
+            <a:normAutofit fontScale="55000" lnSpcReduction="20000"/>
           </a:bodyPr>
           <a:lstStyle>
             <a:lvl1pPr marL="0" indent="0" algn="l" defTabSz="914400" rtl="0" eaLnBrk="1" latinLnBrk="0" hangingPunct="1">
@@ -24140,21 +24148,13 @@
             </a:lvl9pPr>
           </a:lstStyle>
           <a:p>
-            <a:r>
-              <a:rPr lang="fr-FR" dirty="0">
-                <a:latin typeface="Arial"/>
-                <a:cs typeface="Arial"/>
-              </a:rPr>
-              <a:t>Diana Marek &amp; Thomas </a:t>
-            </a:r>
-            <a:r>
-              <a:rPr lang="fr-FR" dirty="0" err="1">
-                <a:latin typeface="Arial"/>
-                <a:cs typeface="Arial"/>
-              </a:rPr>
-              <a:t>Junier</a:t>
-            </a:r>
-            <a:endParaRPr lang="en-US" dirty="0">
+            <a:endParaRPr lang="en-GB" dirty="0">
+              <a:latin typeface="Arial"/>
+              <a:cs typeface="Arial"/>
+            </a:endParaRPr>
+          </a:p>
+          <a:p>
+            <a:endParaRPr lang="en-GB" dirty="0">
               <a:latin typeface="Arial"/>
               <a:cs typeface="Arial"/>
             </a:endParaRPr>
@@ -24165,50 +24165,9 @@
                 <a:latin typeface="Arial"/>
                 <a:cs typeface="Arial"/>
               </a:rPr>
-              <a:t> -- with slides from </a:t>
-            </a:r>
-            <a:r>
-              <a:rPr lang="en-GB" dirty="0" err="1">
-                <a:latin typeface="Arial"/>
-                <a:cs typeface="Arial"/>
-              </a:rPr>
-              <a:t>Wandrille</a:t>
-            </a:r>
-            <a:r>
-              <a:rPr lang="en-GB" dirty="0">
-                <a:latin typeface="Arial"/>
-                <a:cs typeface="Arial"/>
-              </a:rPr>
-              <a:t> </a:t>
-            </a:r>
-            <a:r>
-              <a:rPr lang="en-GB" dirty="0" err="1">
-                <a:latin typeface="Arial"/>
-                <a:cs typeface="Arial"/>
-              </a:rPr>
-              <a:t>Duchemin</a:t>
-            </a:r>
-            <a:r>
-              <a:rPr lang="en-GB" dirty="0">
-                <a:latin typeface="Arial"/>
-                <a:cs typeface="Arial"/>
-              </a:rPr>
-              <a:t>, </a:t>
-            </a:r>
-            <a:r>
-              <a:rPr lang="en-GB" dirty="0" err="1">
-                <a:latin typeface="Arial"/>
-                <a:cs typeface="Arial"/>
-              </a:rPr>
-              <a:t>Leonore</a:t>
-            </a:r>
-            <a:r>
-              <a:rPr lang="en-GB" dirty="0">
-                <a:latin typeface="Arial"/>
-                <a:cs typeface="Arial"/>
-              </a:rPr>
-              <a:t> Wigger, Diana Marek</a:t>
-            </a:r>
+              <a:t> -- with slides from Wandrille Duchemin, Leonore Wigger, Diana Marek</a:t>
+            </a:r>
+            <a:endParaRPr lang="en-US"/>
           </a:p>
           <a:p>
             <a:endParaRPr lang="en-GB" dirty="0"/>

</xml_diff>